<commit_message>
Project 1 End & Package Presentation Start
</commit_message>
<xml_diff>
--- a/Project1_Clustering/output/ringmatt_project1_presentation.pptx
+++ b/Project1_Clustering/output/ringmatt_project1_presentation.pptx
@@ -5,7 +5,7 @@
     <p:sldMasterId id="2147483713" r:id="rId1"/>
   </p:sldMasterIdLst>
   <p:notesMasterIdLst>
-    <p:notesMasterId r:id="rId8"/>
+    <p:notesMasterId r:id="rId9"/>
   </p:notesMasterIdLst>
   <p:sldIdLst>
     <p:sldId id="256" r:id="rId2"/>
@@ -14,6 +14,7 @@
     <p:sldId id="258" r:id="rId5"/>
     <p:sldId id="263" r:id="rId6"/>
     <p:sldId id="259" r:id="rId7"/>
+    <p:sldId id="264" r:id="rId8"/>
   </p:sldIdLst>
   <p:sldSz cx="12192000" cy="6858000"/>
   <p:notesSz cx="6858000" cy="9144000"/>
@@ -202,7 +203,7 @@
           <a:p>
             <a:fld id="{8C1AD498-B7BB-4814-B411-A5FABB70F851}" type="datetimeFigureOut">
               <a:rPr lang="en-US" smtClean="0"/>
-              <a:t>9/19/2021</a:t>
+              <a:t>9/20/2021</a:t>
             </a:fld>
             <a:endParaRPr lang="en-US"/>
           </a:p>
@@ -513,131 +514,6 @@
           <a:bodyPr/>
           <a:lstStyle/>
           <a:p>
-            <a:pPr marL="171450" indent="-171450">
-              <a:buFont typeface="Arial" panose="020B0604020202020204" pitchFamily="34" charset="0"/>
-              <a:buChar char="•"/>
-            </a:pPr>
-            <a:r>
-              <a:rPr lang="en-US" dirty="0"/>
-              <a:t>Image</a:t>
-            </a:r>
-          </a:p>
-          <a:p>
-            <a:pPr marL="628650" lvl="1" indent="-171450">
-              <a:buFont typeface="Arial" panose="020B0604020202020204" pitchFamily="34" charset="0"/>
-              <a:buChar char="•"/>
-            </a:pPr>
-            <a:r>
-              <a:rPr lang="en-US" dirty="0"/>
-              <a:t>Raw data w/ missing values in white</a:t>
-            </a:r>
-          </a:p>
-          <a:p>
-            <a:pPr marL="171450" indent="-171450">
-              <a:buFont typeface="Arial" panose="020B0604020202020204" pitchFamily="34" charset="0"/>
-              <a:buChar char="•"/>
-            </a:pPr>
-            <a:r>
-              <a:rPr lang="en-US" dirty="0" err="1"/>
-              <a:t>Subsetting</a:t>
-            </a:r>
-            <a:endParaRPr lang="en-US" dirty="0"/>
-          </a:p>
-          <a:p>
-            <a:pPr marL="628650" lvl="1" indent="-171450">
-              <a:buFont typeface="Arial" panose="020B0604020202020204" pitchFamily="34" charset="0"/>
-              <a:buChar char="•"/>
-            </a:pPr>
-            <a:r>
-              <a:rPr lang="en-US" dirty="0"/>
-              <a:t>Time of Life</a:t>
-            </a:r>
-          </a:p>
-          <a:p>
-            <a:pPr marL="1085850" lvl="2" indent="-171450">
-              <a:buFont typeface="Arial" panose="020B0604020202020204" pitchFamily="34" charset="0"/>
-              <a:buChar char="•"/>
-            </a:pPr>
-            <a:r>
-              <a:rPr lang="en-US" dirty="0"/>
-              <a:t>17 columns</a:t>
-            </a:r>
-          </a:p>
-          <a:p>
-            <a:pPr marL="1085850" lvl="2" indent="-171450">
-              <a:buFont typeface="Arial" panose="020B0604020202020204" pitchFamily="34" charset="0"/>
-              <a:buChar char="•"/>
-            </a:pPr>
-            <a:r>
-              <a:rPr lang="en-US" dirty="0"/>
-              <a:t>Ideal age marry (age, none - 000, never - 111)</a:t>
-            </a:r>
-          </a:p>
-          <a:p>
-            <a:pPr marL="171450" lvl="0" indent="-171450">
-              <a:buFont typeface="Arial" panose="020B0604020202020204" pitchFamily="34" charset="0"/>
-              <a:buChar char="•"/>
-            </a:pPr>
-            <a:r>
-              <a:rPr lang="en-US" dirty="0"/>
-              <a:t>Interpretability</a:t>
-            </a:r>
-          </a:p>
-          <a:p>
-            <a:pPr marL="628650" lvl="1" indent="-171450">
-              <a:buFont typeface="Arial" panose="020B0604020202020204" pitchFamily="34" charset="0"/>
-              <a:buChar char="•"/>
-            </a:pPr>
-            <a:r>
-              <a:rPr lang="en-US" dirty="0"/>
-              <a:t>Reordering</a:t>
-            </a:r>
-          </a:p>
-          <a:p>
-            <a:pPr marL="1085850" lvl="2" indent="-171450">
-              <a:buFont typeface="Arial" panose="020B0604020202020204" pitchFamily="34" charset="0"/>
-              <a:buChar char="•"/>
-            </a:pPr>
-            <a:r>
-              <a:rPr lang="en-US" dirty="0"/>
-              <a:t>Human Values</a:t>
-            </a:r>
-          </a:p>
-          <a:p>
-            <a:pPr marL="1543050" lvl="3" indent="-171450">
-              <a:buFont typeface="Arial" panose="020B0604020202020204" pitchFamily="34" charset="0"/>
-              <a:buChar char="•"/>
-            </a:pPr>
-            <a:r>
-              <a:rPr lang="en-US" dirty="0"/>
-              <a:t>1 – “Most like me”</a:t>
-            </a:r>
-          </a:p>
-          <a:p>
-            <a:pPr marL="171450" lvl="0" indent="-171450">
-              <a:buFont typeface="Arial" panose="020B0604020202020204" pitchFamily="34" charset="0"/>
-              <a:buChar char="•"/>
-            </a:pPr>
-            <a:r>
-              <a:rPr lang="en-US" dirty="0"/>
-              <a:t>Note</a:t>
-            </a:r>
-          </a:p>
-          <a:p>
-            <a:pPr marL="628650" lvl="1" indent="-171450">
-              <a:buFont typeface="Arial" panose="020B0604020202020204" pitchFamily="34" charset="0"/>
-              <a:buChar char="•"/>
-            </a:pPr>
-            <a:r>
-              <a:rPr lang="en-US" dirty="0"/>
-              <a:t>Columns missing values systematically</a:t>
-            </a:r>
-          </a:p>
-          <a:p>
-            <a:pPr marL="628650" lvl="1" indent="-171450">
-              <a:buFont typeface="Arial" panose="020B0604020202020204" pitchFamily="34" charset="0"/>
-              <a:buChar char="•"/>
-            </a:pPr>
             <a:endParaRPr lang="en-US" dirty="0"/>
           </a:p>
         </p:txBody>
@@ -659,7 +535,7 @@
           <a:p>
             <a:fld id="{73C4A5E5-93B5-4E72-A75B-1F4FD0DCF1DD}" type="slidenum">
               <a:rPr lang="en-US" smtClean="0"/>
-              <a:t>2</a:t>
+              <a:t>1</a:t>
             </a:fld>
             <a:endParaRPr lang="en-US"/>
           </a:p>
@@ -668,7 +544,7 @@
     </p:spTree>
     <p:extLst>
       <p:ext uri="{BB962C8B-B14F-4D97-AF65-F5344CB8AC3E}">
-        <p14:creationId xmlns:p14="http://schemas.microsoft.com/office/powerpoint/2010/main" val="2997083221"/>
+        <p14:creationId xmlns:p14="http://schemas.microsoft.com/office/powerpoint/2010/main" val="1453588443"/>
       </p:ext>
     </p:extLst>
   </p:cSld>
@@ -728,6 +604,36 @@
             </a:pPr>
             <a:r>
               <a:rPr lang="en-US" dirty="0"/>
+              <a:t>2018</a:t>
+            </a:r>
+          </a:p>
+          <a:p>
+            <a:pPr marL="628650" lvl="1" indent="-171450">
+              <a:buFont typeface="Arial" panose="020B0604020202020204" pitchFamily="34" charset="0"/>
+              <a:buChar char="•"/>
+            </a:pPr>
+            <a:r>
+              <a:rPr lang="en-US" dirty="0"/>
+              <a:t>Justice &amp; Fairness</a:t>
+            </a:r>
+          </a:p>
+          <a:p>
+            <a:pPr marL="628650" lvl="1" indent="-171450">
+              <a:buFont typeface="Arial" panose="020B0604020202020204" pitchFamily="34" charset="0"/>
+              <a:buChar char="•"/>
+            </a:pPr>
+            <a:r>
+              <a:rPr lang="en-US" dirty="0"/>
+              <a:t>Timing of Life</a:t>
+            </a:r>
+          </a:p>
+          <a:p>
+            <a:pPr marL="171450" indent="-171450">
+              <a:buFont typeface="Arial" panose="020B0604020202020204" pitchFamily="34" charset="0"/>
+              <a:buChar char="•"/>
+            </a:pPr>
+            <a:r>
+              <a:rPr lang="en-US" dirty="0"/>
               <a:t>Image</a:t>
             </a:r>
           </a:p>
@@ -738,7 +644,7 @@
             </a:pPr>
             <a:r>
               <a:rPr lang="en-US" dirty="0"/>
-              <a:t>Just before remaining observations removed</a:t>
+              <a:t>Raw data w/ missing values in white</a:t>
             </a:r>
           </a:p>
           <a:p>
@@ -747,8 +653,29 @@
               <a:buChar char="•"/>
             </a:pPr>
             <a:r>
+              <a:rPr lang="en-US" dirty="0" err="1"/>
+              <a:t>Subsetting</a:t>
+            </a:r>
+            <a:endParaRPr lang="en-US" dirty="0"/>
+          </a:p>
+          <a:p>
+            <a:pPr marL="628650" lvl="1" indent="-171450">
+              <a:buFont typeface="Arial" panose="020B0604020202020204" pitchFamily="34" charset="0"/>
+              <a:buChar char="•"/>
+            </a:pPr>
+            <a:r>
               <a:rPr lang="en-US" dirty="0"/>
-              <a:t>Missing</a:t>
+              <a:t>Countries</a:t>
+            </a:r>
+          </a:p>
+          <a:p>
+            <a:pPr marL="1085850" lvl="2" indent="-171450">
+              <a:buFont typeface="Arial" panose="020B0604020202020204" pitchFamily="34" charset="0"/>
+              <a:buChar char="•"/>
+            </a:pPr>
+            <a:r>
+              <a:rPr lang="en-US" dirty="0"/>
+              <a:t>Diagonal</a:t>
             </a:r>
           </a:p>
           <a:p>
@@ -758,7 +685,7 @@
             </a:pPr>
             <a:r>
               <a:rPr lang="en-US" dirty="0"/>
-              <a:t>Columns</a:t>
+              <a:t>Mixed-Type</a:t>
             </a:r>
           </a:p>
           <a:p>
@@ -768,7 +695,7 @@
             </a:pPr>
             <a:r>
               <a:rPr lang="en-US" dirty="0"/>
-              <a:t>Timing of Life Age of grandchildren, marriage, children, etc.</a:t>
+              <a:t>17 Time of Life columns</a:t>
             </a:r>
           </a:p>
           <a:p>
@@ -778,7 +705,17 @@
             </a:pPr>
             <a:r>
               <a:rPr lang="en-US" dirty="0"/>
-              <a:t>Thus not losing older participants</a:t>
+              <a:t>Ideal age marry</a:t>
+            </a:r>
+          </a:p>
+          <a:p>
+            <a:pPr marL="171450" lvl="0" indent="-171450">
+              <a:buFont typeface="Arial" panose="020B0604020202020204" pitchFamily="34" charset="0"/>
+              <a:buChar char="•"/>
+            </a:pPr>
+            <a:r>
+              <a:rPr lang="en-US" dirty="0"/>
+              <a:t>Interpretability</a:t>
             </a:r>
           </a:p>
           <a:p>
@@ -788,7 +725,7 @@
             </a:pPr>
             <a:r>
               <a:rPr lang="en-US" dirty="0"/>
-              <a:t>Rows</a:t>
+              <a:t>Reordering</a:t>
             </a:r>
           </a:p>
           <a:p>
@@ -798,7 +735,7 @@
             </a:pPr>
             <a:r>
               <a:rPr lang="en-US" dirty="0"/>
-              <a:t>~24,000 (48%) removed</a:t>
+              <a:t>Human Values</a:t>
             </a:r>
           </a:p>
           <a:p>
@@ -808,47 +745,7 @@
             </a:pPr>
             <a:r>
               <a:rPr lang="en-US" dirty="0"/>
-              <a:t>Refused, didn’t know, didn’t answer</a:t>
-            </a:r>
-          </a:p>
-          <a:p>
-            <a:pPr marL="171450" lvl="0" indent="-171450">
-              <a:buFont typeface="Arial" panose="020B0604020202020204" pitchFamily="34" charset="0"/>
-              <a:buChar char="•"/>
-            </a:pPr>
-            <a:r>
-              <a:rPr lang="en-US" dirty="0"/>
-              <a:t>Dimensionality</a:t>
-            </a:r>
-          </a:p>
-          <a:p>
-            <a:pPr marL="628650" lvl="1" indent="-171450">
-              <a:buFont typeface="Arial" panose="020B0604020202020204" pitchFamily="34" charset="0"/>
-              <a:buChar char="•"/>
-            </a:pPr>
-            <a:r>
-              <a:rPr lang="en-US" dirty="0"/>
-              <a:t>Columns</a:t>
-            </a:r>
-          </a:p>
-          <a:p>
-            <a:pPr marL="1085850" lvl="2" indent="-171450">
-              <a:buFont typeface="Arial" panose="020B0604020202020204" pitchFamily="34" charset="0"/>
-              <a:buChar char="•"/>
-            </a:pPr>
-            <a:r>
-              <a:rPr lang="en-US" dirty="0"/>
-              <a:t>51% removed</a:t>
-            </a:r>
-          </a:p>
-          <a:p>
-            <a:pPr marL="1085850" lvl="2" indent="-171450">
-              <a:buFont typeface="Arial" panose="020B0604020202020204" pitchFamily="34" charset="0"/>
-              <a:buChar char="•"/>
-            </a:pPr>
-            <a:r>
-              <a:rPr lang="en-US" dirty="0"/>
-              <a:t>Mostly Timing of Life information</a:t>
+              <a:t>1 – “Most like me”</a:t>
             </a:r>
           </a:p>
         </p:txBody>
@@ -870,7 +767,7 @@
           <a:p>
             <a:fld id="{73C4A5E5-93B5-4E72-A75B-1F4FD0DCF1DD}" type="slidenum">
               <a:rPr lang="en-US" smtClean="0"/>
-              <a:t>3</a:t>
+              <a:t>2</a:t>
             </a:fld>
             <a:endParaRPr lang="en-US"/>
           </a:p>
@@ -879,7 +776,7 @@
     </p:spTree>
     <p:extLst>
       <p:ext uri="{BB962C8B-B14F-4D97-AF65-F5344CB8AC3E}">
-        <p14:creationId xmlns:p14="http://schemas.microsoft.com/office/powerpoint/2010/main" val="4266993140"/>
+        <p14:creationId xmlns:p14="http://schemas.microsoft.com/office/powerpoint/2010/main" val="2997083221"/>
       </p:ext>
     </p:extLst>
   </p:cSld>
@@ -939,7 +836,7 @@
             </a:pPr>
             <a:r>
               <a:rPr lang="en-US" dirty="0"/>
-              <a:t>Outliers</a:t>
+              <a:t>Image</a:t>
             </a:r>
           </a:p>
           <a:p>
@@ -949,7 +846,27 @@
             </a:pPr>
             <a:r>
               <a:rPr lang="en-US" dirty="0"/>
-              <a:t>Large Range</a:t>
+              <a:t>Just before remaining observations removed</a:t>
+            </a:r>
+          </a:p>
+          <a:p>
+            <a:pPr marL="171450" indent="-171450">
+              <a:buFont typeface="Arial" panose="020B0604020202020204" pitchFamily="34" charset="0"/>
+              <a:buChar char="•"/>
+            </a:pPr>
+            <a:r>
+              <a:rPr lang="en-US" dirty="0"/>
+              <a:t>Missing</a:t>
+            </a:r>
+          </a:p>
+          <a:p>
+            <a:pPr marL="628650" lvl="1" indent="-171450">
+              <a:buFont typeface="Arial" panose="020B0604020202020204" pitchFamily="34" charset="0"/>
+              <a:buChar char="•"/>
+            </a:pPr>
+            <a:r>
+              <a:rPr lang="en-US" dirty="0"/>
+              <a:t>Columns</a:t>
             </a:r>
           </a:p>
           <a:p>
@@ -959,7 +876,37 @@
             </a:pPr>
             <a:r>
               <a:rPr lang="en-US" dirty="0"/>
-              <a:t>Minutes of news per day</a:t>
+              <a:t>Timing of Life </a:t>
+            </a:r>
+          </a:p>
+          <a:p>
+            <a:pPr marL="628650" lvl="1" indent="-171450">
+              <a:buFont typeface="Arial" panose="020B0604020202020204" pitchFamily="34" charset="0"/>
+              <a:buChar char="•"/>
+            </a:pPr>
+            <a:r>
+              <a:rPr lang="en-US" dirty="0"/>
+              <a:t>Rows</a:t>
+            </a:r>
+          </a:p>
+          <a:p>
+            <a:pPr marL="1085850" lvl="2" indent="-171450">
+              <a:buFont typeface="Arial" panose="020B0604020202020204" pitchFamily="34" charset="0"/>
+              <a:buChar char="•"/>
+            </a:pPr>
+            <a:r>
+              <a:rPr lang="en-US" dirty="0"/>
+              <a:t>Refused, didn’t know, didn’t answer</a:t>
+            </a:r>
+          </a:p>
+          <a:p>
+            <a:pPr marL="1085850" lvl="2" indent="-171450">
+              <a:buFont typeface="Arial" panose="020B0604020202020204" pitchFamily="34" charset="0"/>
+              <a:buChar char="•"/>
+            </a:pPr>
+            <a:r>
+              <a:rPr lang="en-US" dirty="0"/>
+              <a:t>Hungary</a:t>
             </a:r>
           </a:p>
           <a:p>
@@ -969,7 +916,7 @@
             </a:pPr>
             <a:r>
               <a:rPr lang="en-US" dirty="0"/>
-              <a:t>16+ hours/day </a:t>
+              <a:t>Missing block</a:t>
             </a:r>
           </a:p>
           <a:p>
@@ -979,7 +926,17 @@
             </a:pPr>
             <a:r>
               <a:rPr lang="en-US" dirty="0"/>
-              <a:t>24 hours/day value…</a:t>
+              <a:t>Immigration questions</a:t>
+            </a:r>
+          </a:p>
+          <a:p>
+            <a:pPr marL="171450" lvl="0" indent="-171450">
+              <a:buFont typeface="Arial" panose="020B0604020202020204" pitchFamily="34" charset="0"/>
+              <a:buChar char="•"/>
+            </a:pPr>
+            <a:r>
+              <a:rPr lang="en-US" dirty="0"/>
+              <a:t>Dimensionality</a:t>
             </a:r>
           </a:p>
           <a:p>
@@ -989,7 +946,7 @@
             </a:pPr>
             <a:r>
               <a:rPr lang="en-US" dirty="0"/>
-              <a:t>Bounded Responses – Common answers</a:t>
+              <a:t>Columns</a:t>
             </a:r>
           </a:p>
           <a:p>
@@ -999,7 +956,7 @@
             </a:pPr>
             <a:r>
               <a:rPr lang="en-US" dirty="0"/>
-              <a:t>Trust</a:t>
+              <a:t>51% removed</a:t>
             </a:r>
           </a:p>
           <a:p>
@@ -1009,7 +966,17 @@
             </a:pPr>
             <a:r>
               <a:rPr lang="en-US" dirty="0"/>
-              <a:t>Yes/No</a:t>
+              <a:t>Mostly Timing of Life information</a:t>
+            </a:r>
+          </a:p>
+          <a:p>
+            <a:pPr marL="628650" lvl="1" indent="-171450">
+              <a:buFont typeface="Arial" panose="020B0604020202020204" pitchFamily="34" charset="0"/>
+              <a:buChar char="•"/>
+            </a:pPr>
+            <a:r>
+              <a:rPr lang="en-US" dirty="0"/>
+              <a:t>Half of rows &amp; columns</a:t>
             </a:r>
           </a:p>
         </p:txBody>
@@ -1031,7 +998,7 @@
           <a:p>
             <a:fld id="{73C4A5E5-93B5-4E72-A75B-1F4FD0DCF1DD}" type="slidenum">
               <a:rPr lang="en-US" smtClean="0"/>
-              <a:t>4</a:t>
+              <a:t>3</a:t>
             </a:fld>
             <a:endParaRPr lang="en-US"/>
           </a:p>
@@ -1040,7 +1007,7 @@
     </p:spTree>
     <p:extLst>
       <p:ext uri="{BB962C8B-B14F-4D97-AF65-F5344CB8AC3E}">
-        <p14:creationId xmlns:p14="http://schemas.microsoft.com/office/powerpoint/2010/main" val="2074682980"/>
+        <p14:creationId xmlns:p14="http://schemas.microsoft.com/office/powerpoint/2010/main" val="4266993140"/>
       </p:ext>
     </p:extLst>
   </p:cSld>
@@ -1100,40 +1067,37 @@
             </a:pPr>
             <a:r>
               <a:rPr lang="en-US" dirty="0"/>
-              <a:t>Explanations</a:t>
-            </a:r>
-          </a:p>
-          <a:p>
-            <a:pPr marL="171450" lvl="0" indent="-171450">
+              <a:t>Altair Elbow plot</a:t>
+            </a:r>
+          </a:p>
+          <a:p>
+            <a:pPr marL="171450" indent="-171450">
               <a:buFont typeface="Arial" panose="020B0604020202020204" pitchFamily="34" charset="0"/>
               <a:buChar char="•"/>
             </a:pPr>
             <a:r>
               <a:rPr lang="en-US" dirty="0"/>
-              <a:t>Disenfranchised</a:t>
-            </a:r>
-          </a:p>
-          <a:p>
-            <a:pPr marL="628650" marR="0" lvl="1" indent="-171450" algn="l" defTabSz="914400" rtl="0" eaLnBrk="1" fontAlgn="auto" latinLnBrk="0" hangingPunct="1">
-              <a:lnSpc>
-                <a:spcPct val="100000"/>
-              </a:lnSpc>
-              <a:spcBef>
-                <a:spcPts val="0"/>
-              </a:spcBef>
-              <a:spcAft>
-                <a:spcPts val="0"/>
-              </a:spcAft>
-              <a:buClrTx/>
-              <a:buSzTx/>
+              <a:t>Outliers</a:t>
+            </a:r>
+          </a:p>
+          <a:p>
+            <a:pPr marL="628650" lvl="1" indent="-171450">
               <a:buFont typeface="Arial" panose="020B0604020202020204" pitchFamily="34" charset="0"/>
               <a:buChar char="•"/>
-              <a:tabLst/>
-              <a:defRPr/>
             </a:pPr>
             <a:r>
               <a:rPr lang="en-US" dirty="0"/>
-              <a:t>UNSATISFIED WITH DEMOCRACY</a:t>
+              <a:t>Large Range</a:t>
+            </a:r>
+          </a:p>
+          <a:p>
+            <a:pPr marL="1085850" lvl="2" indent="-171450">
+              <a:buFont typeface="Arial" panose="020B0604020202020204" pitchFamily="34" charset="0"/>
+              <a:buChar char="•"/>
+            </a:pPr>
+            <a:r>
+              <a:rPr lang="en-US" dirty="0"/>
+              <a:t>Minutes of news per day</a:t>
             </a:r>
           </a:p>
           <a:p>
@@ -1143,145 +1107,28 @@
             </a:pPr>
             <a:r>
               <a:rPr lang="en-US" dirty="0"/>
-              <a:t>“Political system” doesn’t allow for a say in government or influence on politics</a:t>
-            </a:r>
-          </a:p>
-          <a:p>
-            <a:pPr marL="628650" lvl="1" indent="-171450">
+              <a:t>Common answers</a:t>
+            </a:r>
+          </a:p>
+          <a:p>
+            <a:pPr marL="1085850" lvl="2" indent="-171450">
               <a:buFont typeface="Arial" panose="020B0604020202020204" pitchFamily="34" charset="0"/>
               <a:buChar char="•"/>
             </a:pPr>
             <a:r>
               <a:rPr lang="en-US" dirty="0"/>
-              <a:t>Interested in Politics</a:t>
-            </a:r>
-          </a:p>
-          <a:p>
-            <a:pPr marL="171450" lvl="0" indent="-171450">
+              <a:t>Trust</a:t>
+            </a:r>
+          </a:p>
+          <a:p>
+            <a:pPr marL="1085850" lvl="2" indent="-171450">
               <a:buFont typeface="Arial" panose="020B0604020202020204" pitchFamily="34" charset="0"/>
               <a:buChar char="•"/>
             </a:pPr>
             <a:r>
               <a:rPr lang="en-US" dirty="0"/>
-              <a:t>News</a:t>
-            </a:r>
-          </a:p>
-          <a:p>
-            <a:pPr marL="628650" lvl="1" indent="-171450">
-              <a:buFont typeface="Arial" panose="020B0604020202020204" pitchFamily="34" charset="0"/>
-              <a:buChar char="•"/>
-            </a:pPr>
-            <a:r>
-              <a:rPr lang="en-US" dirty="0"/>
-              <a:t>0.98 – time spent consuming news</a:t>
-            </a:r>
-          </a:p>
-          <a:p>
-            <a:pPr marL="171450" lvl="0" indent="-171450">
-              <a:buFont typeface="Arial" panose="020B0604020202020204" pitchFamily="34" charset="0"/>
-              <a:buChar char="•"/>
-            </a:pPr>
-            <a:r>
-              <a:rPr lang="en-US" dirty="0"/>
-              <a:t>Distrustful</a:t>
-            </a:r>
-          </a:p>
-          <a:p>
-            <a:pPr marL="628650" lvl="1" indent="-171450">
-              <a:buFont typeface="Arial" panose="020B0604020202020204" pitchFamily="34" charset="0"/>
-              <a:buChar char="•"/>
-            </a:pPr>
-            <a:r>
-              <a:rPr lang="en-US" dirty="0"/>
-              <a:t>National government</a:t>
-            </a:r>
-          </a:p>
-          <a:p>
-            <a:pPr marL="628650" lvl="1" indent="-171450">
-              <a:buFont typeface="Arial" panose="020B0604020202020204" pitchFamily="34" charset="0"/>
-              <a:buChar char="•"/>
-            </a:pPr>
-            <a:r>
-              <a:rPr lang="en-US" dirty="0"/>
-              <a:t>Government transparency</a:t>
-            </a:r>
-          </a:p>
-          <a:p>
-            <a:pPr marL="628650" lvl="1" indent="-171450">
-              <a:buFont typeface="Arial" panose="020B0604020202020204" pitchFamily="34" charset="0"/>
-              <a:buChar char="•"/>
-            </a:pPr>
-            <a:r>
-              <a:rPr lang="en-US" dirty="0"/>
-              <a:t>Parties</a:t>
-            </a:r>
-          </a:p>
-          <a:p>
-            <a:pPr marL="628650" lvl="1" indent="-171450">
-              <a:buFont typeface="Arial" panose="020B0604020202020204" pitchFamily="34" charset="0"/>
-              <a:buChar char="•"/>
-            </a:pPr>
-            <a:r>
-              <a:rPr lang="en-US" dirty="0"/>
-              <a:t>Government doesn't care</a:t>
-            </a:r>
-          </a:p>
-          <a:p>
-            <a:pPr marL="628650" lvl="1" indent="-171450">
-              <a:buFont typeface="Arial" panose="020B0604020202020204" pitchFamily="34" charset="0"/>
-              <a:buChar char="•"/>
-            </a:pPr>
-            <a:r>
-              <a:rPr lang="en-US" dirty="0"/>
-              <a:t>UNSATISFIED WITH DEMOCRACY</a:t>
-            </a:r>
-          </a:p>
-          <a:p>
-            <a:pPr marL="171450" lvl="0" indent="-171450">
-              <a:buFont typeface="Arial" panose="020B0604020202020204" pitchFamily="34" charset="0"/>
-              <a:buChar char="•"/>
-            </a:pPr>
-            <a:r>
-              <a:rPr lang="en-US" dirty="0"/>
-              <a:t>Individualism</a:t>
-            </a:r>
-          </a:p>
-          <a:p>
-            <a:pPr marL="628650" lvl="1" indent="-171450">
-              <a:buFont typeface="Arial" panose="020B0604020202020204" pitchFamily="34" charset="0"/>
-              <a:buChar char="•"/>
-            </a:pPr>
-            <a:r>
-              <a:rPr lang="en-US" dirty="0"/>
-              <a:t>Disagreed with human values questions about sacrificing for environment, society, etc.</a:t>
-            </a:r>
-          </a:p>
-          <a:p>
-            <a:pPr marL="171450" lvl="0" indent="-171450">
-              <a:buFont typeface="Arial" panose="020B0604020202020204" pitchFamily="34" charset="0"/>
-              <a:buChar char="•"/>
-            </a:pPr>
-            <a:r>
-              <a:rPr lang="en-US" dirty="0"/>
-              <a:t>Materialism</a:t>
-            </a:r>
-          </a:p>
-          <a:p>
-            <a:pPr marL="628650" lvl="1" indent="-171450">
-              <a:buFont typeface="Arial" panose="020B0604020202020204" pitchFamily="34" charset="0"/>
-              <a:buChar char="•"/>
-            </a:pPr>
-            <a:r>
-              <a:rPr lang="en-US" dirty="0"/>
-              <a:t>High internet usage</a:t>
-            </a:r>
-          </a:p>
-          <a:p>
-            <a:pPr marL="628650" lvl="1" indent="-171450">
-              <a:buFont typeface="Arial" panose="020B0604020202020204" pitchFamily="34" charset="0"/>
-              <a:buChar char="•"/>
-            </a:pPr>
-            <a:endParaRPr lang="en-US" dirty="0"/>
+              <a:t>Yes/No</a:t>
+            </a:r>
           </a:p>
         </p:txBody>
       </p:sp>
@@ -1302,7 +1149,7 @@
           <a:p>
             <a:fld id="{73C4A5E5-93B5-4E72-A75B-1F4FD0DCF1DD}" type="slidenum">
               <a:rPr lang="en-US" smtClean="0"/>
-              <a:t>5</a:t>
+              <a:t>4</a:t>
             </a:fld>
             <a:endParaRPr lang="en-US"/>
           </a:p>
@@ -1311,7 +1158,7 @@
     </p:spTree>
     <p:extLst>
       <p:ext uri="{BB962C8B-B14F-4D97-AF65-F5344CB8AC3E}">
-        <p14:creationId xmlns:p14="http://schemas.microsoft.com/office/powerpoint/2010/main" val="2951986729"/>
+        <p14:creationId xmlns:p14="http://schemas.microsoft.com/office/powerpoint/2010/main" val="2074682980"/>
       </p:ext>
     </p:extLst>
   </p:cSld>
@@ -1365,13 +1212,267 @@
           <a:bodyPr/>
           <a:lstStyle/>
           <a:p>
+            <a:pPr marL="171450" indent="-171450">
+              <a:buFont typeface="Arial" panose="020B0604020202020204" pitchFamily="34" charset="0"/>
+              <a:buChar char="•"/>
+            </a:pPr>
+            <a:r>
+              <a:rPr lang="en-US" dirty="0"/>
+              <a:t>Explanations</a:t>
+            </a:r>
+          </a:p>
+          <a:p>
+            <a:pPr marL="171450" lvl="0" indent="-171450">
+              <a:buFont typeface="Arial" panose="020B0604020202020204" pitchFamily="34" charset="0"/>
+              <a:buChar char="•"/>
+            </a:pPr>
+            <a:r>
+              <a:rPr lang="en-US" dirty="0"/>
+              <a:t>Disenfranchised</a:t>
+            </a:r>
+          </a:p>
+          <a:p>
+            <a:pPr marL="628650" marR="0" lvl="1" indent="-171450" algn="l" defTabSz="914400" rtl="0" eaLnBrk="1" fontAlgn="auto" latinLnBrk="0" hangingPunct="1">
+              <a:lnSpc>
+                <a:spcPct val="100000"/>
+              </a:lnSpc>
+              <a:spcBef>
+                <a:spcPts val="0"/>
+              </a:spcBef>
+              <a:spcAft>
+                <a:spcPts val="0"/>
+              </a:spcAft>
+              <a:buClrTx/>
+              <a:buSzTx/>
+              <a:buFont typeface="Arial" panose="020B0604020202020204" pitchFamily="34" charset="0"/>
+              <a:buChar char="•"/>
+              <a:tabLst/>
+              <a:defRPr/>
+            </a:pPr>
+            <a:r>
+              <a:rPr lang="en-US" dirty="0"/>
+              <a:t>UNSATISFIED WITH DEMOCRACY</a:t>
+            </a:r>
+          </a:p>
+          <a:p>
+            <a:pPr marL="171450" lvl="0" indent="-171450">
+              <a:buFont typeface="Arial" panose="020B0604020202020204" pitchFamily="34" charset="0"/>
+              <a:buChar char="•"/>
+            </a:pPr>
+            <a:r>
+              <a:rPr lang="en-US" dirty="0"/>
+              <a:t>News</a:t>
+            </a:r>
+          </a:p>
+          <a:p>
+            <a:pPr marL="628650" lvl="1" indent="-171450">
+              <a:buFont typeface="Arial" panose="020B0604020202020204" pitchFamily="34" charset="0"/>
+              <a:buChar char="•"/>
+            </a:pPr>
+            <a:r>
+              <a:rPr lang="en-US" dirty="0"/>
+              <a:t>0.98 – time spent consuming news</a:t>
+            </a:r>
+          </a:p>
+          <a:p>
+            <a:pPr marL="171450" lvl="0" indent="-171450">
+              <a:buFont typeface="Arial" panose="020B0604020202020204" pitchFamily="34" charset="0"/>
+              <a:buChar char="•"/>
+            </a:pPr>
+            <a:r>
+              <a:rPr lang="en-US" dirty="0"/>
+              <a:t>Distrustful</a:t>
+            </a:r>
+          </a:p>
+          <a:p>
+            <a:pPr marL="628650" marR="0" lvl="1" indent="-171450" algn="l" defTabSz="914400" rtl="0" eaLnBrk="1" fontAlgn="auto" latinLnBrk="0" hangingPunct="1">
+              <a:lnSpc>
+                <a:spcPct val="100000"/>
+              </a:lnSpc>
+              <a:spcBef>
+                <a:spcPts val="0"/>
+              </a:spcBef>
+              <a:spcAft>
+                <a:spcPts val="0"/>
+              </a:spcAft>
+              <a:buClrTx/>
+              <a:buSzTx/>
+              <a:buFont typeface="Arial" panose="020B0604020202020204" pitchFamily="34" charset="0"/>
+              <a:buChar char="•"/>
+              <a:tabLst/>
+              <a:defRPr/>
+            </a:pPr>
+            <a:r>
+              <a:rPr lang="en-US" dirty="0"/>
+              <a:t>UNSATISFIED WITH DEMOCRACY</a:t>
+            </a:r>
+          </a:p>
+          <a:p>
+            <a:pPr marL="628650" lvl="1" indent="-171450">
+              <a:buFont typeface="Arial" panose="020B0604020202020204" pitchFamily="34" charset="0"/>
+              <a:buChar char="•"/>
+            </a:pPr>
+            <a:r>
+              <a:rPr lang="en-US" dirty="0"/>
+              <a:t>National government</a:t>
+            </a:r>
+          </a:p>
+          <a:p>
+            <a:pPr marL="628650" lvl="1" indent="-171450">
+              <a:buFont typeface="Arial" panose="020B0604020202020204" pitchFamily="34" charset="0"/>
+              <a:buChar char="•"/>
+            </a:pPr>
+            <a:r>
+              <a:rPr lang="en-US" dirty="0"/>
+              <a:t>Transparency</a:t>
+            </a:r>
+          </a:p>
+          <a:p>
+            <a:pPr marL="628650" lvl="1" indent="-171450">
+              <a:buFont typeface="Arial" panose="020B0604020202020204" pitchFamily="34" charset="0"/>
+              <a:buChar char="•"/>
+            </a:pPr>
+            <a:r>
+              <a:rPr lang="en-US" dirty="0"/>
+              <a:t>Government doesn't care</a:t>
+            </a:r>
+          </a:p>
+          <a:p>
+            <a:pPr marL="171450" lvl="0" indent="-171450">
+              <a:buFont typeface="Arial" panose="020B0604020202020204" pitchFamily="34" charset="0"/>
+              <a:buChar char="•"/>
+            </a:pPr>
+            <a:r>
+              <a:rPr lang="en-US" dirty="0"/>
+              <a:t>Individualism</a:t>
+            </a:r>
+          </a:p>
+          <a:p>
+            <a:pPr marL="628650" lvl="1" indent="-171450">
+              <a:buFont typeface="Arial" panose="020B0604020202020204" pitchFamily="34" charset="0"/>
+              <a:buChar char="•"/>
+            </a:pPr>
+            <a:r>
+              <a:rPr lang="en-US" dirty="0"/>
+              <a:t>Disagreed with sacrificing for environment, society, etc.</a:t>
+            </a:r>
+          </a:p>
+          <a:p>
+            <a:pPr marL="171450" lvl="0" indent="-171450">
+              <a:buFont typeface="Arial" panose="020B0604020202020204" pitchFamily="34" charset="0"/>
+              <a:buChar char="•"/>
+            </a:pPr>
+            <a:r>
+              <a:rPr lang="en-US" dirty="0"/>
+              <a:t>Materialism</a:t>
+            </a:r>
+          </a:p>
+          <a:p>
+            <a:pPr marL="628650" lvl="1" indent="-171450">
+              <a:buFont typeface="Arial" panose="020B0604020202020204" pitchFamily="34" charset="0"/>
+              <a:buChar char="•"/>
+            </a:pPr>
+            <a:r>
+              <a:rPr lang="en-US" dirty="0"/>
+              <a:t>High internet usage</a:t>
+            </a:r>
+          </a:p>
+          <a:p>
+            <a:pPr marL="628650" lvl="1" indent="-171450">
+              <a:buFont typeface="Arial" panose="020B0604020202020204" pitchFamily="34" charset="0"/>
+              <a:buChar char="•"/>
+            </a:pPr>
+            <a:endParaRPr lang="en-US" dirty="0"/>
+          </a:p>
+        </p:txBody>
+      </p:sp>
+      <p:sp>
+        <p:nvSpPr>
+          <p:cNvPr id="4" name="Slide Number Placeholder 3"/>
+          <p:cNvSpPr>
+            <a:spLocks noGrp="1"/>
+          </p:cNvSpPr>
+          <p:nvPr>
+            <p:ph type="sldNum" sz="quarter" idx="5"/>
+          </p:nvPr>
+        </p:nvSpPr>
+        <p:spPr/>
+        <p:txBody>
+          <a:bodyPr/>
+          <a:lstStyle/>
+          <a:p>
+            <a:fld id="{73C4A5E5-93B5-4E72-A75B-1F4FD0DCF1DD}" type="slidenum">
+              <a:rPr lang="en-US" smtClean="0"/>
+              <a:t>5</a:t>
+            </a:fld>
+            <a:endParaRPr lang="en-US"/>
+          </a:p>
+        </p:txBody>
+      </p:sp>
+    </p:spTree>
+    <p:extLst>
+      <p:ext uri="{BB962C8B-B14F-4D97-AF65-F5344CB8AC3E}">
+        <p14:creationId xmlns:p14="http://schemas.microsoft.com/office/powerpoint/2010/main" val="2951986729"/>
+      </p:ext>
+    </p:extLst>
+  </p:cSld>
+  <p:clrMapOvr>
+    <a:masterClrMapping/>
+  </p:clrMapOvr>
+</p:notes>
+</file>
+
+<file path=ppt/notesSlides/notesSlide6.xml><?xml version="1.0" encoding="utf-8"?>
+<p:notes xmlns:a="http://schemas.openxmlformats.org/drawingml/2006/main" xmlns:r="http://schemas.openxmlformats.org/officeDocument/2006/relationships" xmlns:p="http://schemas.openxmlformats.org/presentationml/2006/main">
+  <p:cSld>
+    <p:spTree>
+      <p:nvGrpSpPr>
+        <p:cNvPr id="1" name=""/>
+        <p:cNvGrpSpPr/>
+        <p:nvPr/>
+      </p:nvGrpSpPr>
+      <p:grpSpPr>
+        <a:xfrm>
+          <a:off x="0" y="0"/>
+          <a:ext cx="0" cy="0"/>
+          <a:chOff x="0" y="0"/>
+          <a:chExt cx="0" cy="0"/>
+        </a:xfrm>
+      </p:grpSpPr>
+      <p:sp>
+        <p:nvSpPr>
+          <p:cNvPr id="2" name="Slide Image Placeholder 1"/>
+          <p:cNvSpPr>
+            <a:spLocks noGrp="1" noRot="1" noChangeAspect="1"/>
+          </p:cNvSpPr>
+          <p:nvPr>
+            <p:ph type="sldImg"/>
+          </p:nvPr>
+        </p:nvSpPr>
+        <p:spPr/>
+      </p:sp>
+      <p:sp>
+        <p:nvSpPr>
+          <p:cNvPr id="3" name="Notes Placeholder 2"/>
+          <p:cNvSpPr>
+            <a:spLocks noGrp="1"/>
+          </p:cNvSpPr>
+          <p:nvPr>
+            <p:ph type="body" idx="1"/>
+          </p:nvPr>
+        </p:nvSpPr>
+        <p:spPr/>
+        <p:txBody>
+          <a:bodyPr/>
+          <a:lstStyle/>
+          <a:p>
             <a:pPr marL="0" indent="0">
               <a:buFont typeface="Arial" panose="020B0604020202020204" pitchFamily="34" charset="0"/>
               <a:buNone/>
             </a:pPr>
             <a:r>
               <a:rPr lang="en-US" dirty="0"/>
-              <a:t>Dissatisfaction, Distrust, Disenfranchisement, Disengagement</a:t>
+              <a:t>- No specific policy takeaways, just broad results</a:t>
             </a:r>
           </a:p>
           <a:p>
@@ -1379,13 +1480,16 @@
               <a:buFont typeface="Arial" panose="020B0604020202020204" pitchFamily="34" charset="0"/>
               <a:buNone/>
             </a:pPr>
+            <a:endParaRPr lang="en-US" dirty="0"/>
+          </a:p>
+          <a:p>
+            <a:pPr marL="0" indent="0">
+              <a:buFont typeface="Arial" panose="020B0604020202020204" pitchFamily="34" charset="0"/>
+              <a:buNone/>
+            </a:pPr>
             <a:r>
               <a:rPr lang="en-US" dirty="0"/>
-              <a:t>- Who is likely to </a:t>
-            </a:r>
-            <a:r>
-              <a:rPr lang="en-US"/>
-              <a:t>feel this way?</a:t>
+              <a:t>- Numbers represent principal components</a:t>
             </a:r>
           </a:p>
           <a:p>
@@ -1396,9 +1500,9 @@
             <a:endParaRPr lang="en-US" dirty="0"/>
           </a:p>
           <a:p>
-            <a:pPr marL="171450" indent="-171450">
-              <a:buFont typeface="Arial" panose="020B0604020202020204" pitchFamily="34" charset="0"/>
-              <a:buChar char="•"/>
+            <a:pPr marL="228600" indent="-228600">
+              <a:buFont typeface="Arial" panose="020B0604020202020204" pitchFamily="34" charset="0"/>
+              <a:buAutoNum type="arabicPeriod"/>
             </a:pPr>
             <a:r>
               <a:rPr lang="en-US" dirty="0"/>
@@ -1406,104 +1510,86 @@
             </a:r>
           </a:p>
           <a:p>
-            <a:pPr marL="628650" lvl="1" indent="-171450">
-              <a:buFont typeface="Arial" panose="020B0604020202020204" pitchFamily="34" charset="0"/>
-              <a:buChar char="•"/>
+            <a:pPr marL="685800" lvl="1" indent="-228600">
+              <a:buFont typeface="Arial" panose="020B0604020202020204" pitchFamily="34" charset="0"/>
+              <a:buAutoNum type="arabicPeriod"/>
             </a:pPr>
             <a:r>
               <a:rPr lang="en-US" dirty="0"/>
-              <a:t>Right</a:t>
-            </a:r>
-          </a:p>
-          <a:p>
-            <a:pPr marL="1085850" lvl="2" indent="-171450">
-              <a:buFont typeface="Arial" panose="020B0604020202020204" pitchFamily="34" charset="0"/>
-              <a:buChar char="•"/>
+              <a:t>Similar sentiments, different types</a:t>
+            </a:r>
+          </a:p>
+          <a:p>
+            <a:pPr marL="228600" lvl="0" indent="-228600">
+              <a:buFont typeface="Arial" panose="020B0604020202020204" pitchFamily="34" charset="0"/>
+              <a:buAutoNum type="arabicPeriod"/>
             </a:pPr>
             <a:r>
               <a:rPr lang="en-US" dirty="0"/>
-              <a:t>Concerned with “lack of influence”</a:t>
-            </a:r>
-          </a:p>
-          <a:p>
-            <a:pPr marL="628650" lvl="1" indent="-171450">
-              <a:buFont typeface="Arial" panose="020B0604020202020204" pitchFamily="34" charset="0"/>
-              <a:buChar char="•"/>
+              <a:t>Engagement </a:t>
+            </a:r>
+            <a:r>
+              <a:rPr lang="en-US"/>
+              <a:t>with politics</a:t>
+            </a:r>
+            <a:endParaRPr lang="en-US" dirty="0"/>
+          </a:p>
+          <a:p>
+            <a:pPr marL="685800" lvl="1" indent="-228600">
+              <a:buFont typeface="Arial" panose="020B0604020202020204" pitchFamily="34" charset="0"/>
+              <a:buAutoNum type="arabicPeriod"/>
             </a:pPr>
             <a:r>
               <a:rPr lang="en-US" dirty="0"/>
-              <a:t>Left</a:t>
-            </a:r>
-          </a:p>
-          <a:p>
-            <a:pPr marL="1085850" lvl="2" indent="-171450">
-              <a:buFont typeface="Arial" panose="020B0604020202020204" pitchFamily="34" charset="0"/>
-              <a:buChar char="•"/>
+              <a:t>Medium of Engagement</a:t>
+            </a:r>
+          </a:p>
+          <a:p>
+            <a:pPr marL="1143000" lvl="2" indent="-228600">
+              <a:buFont typeface="Arial" panose="020B0604020202020204" pitchFamily="34" charset="0"/>
+              <a:buAutoNum type="arabicPeriod"/>
             </a:pPr>
             <a:r>
               <a:rPr lang="en-US" dirty="0"/>
-              <a:t>Concerned with institutions</a:t>
-            </a:r>
-          </a:p>
-          <a:p>
-            <a:pPr marL="628650" lvl="1" indent="-171450">
-              <a:buFont typeface="Arial" panose="020B0604020202020204" pitchFamily="34" charset="0"/>
-              <a:buChar char="•"/>
+              <a:t>Method of contact = who you reach</a:t>
+            </a:r>
+          </a:p>
+          <a:p>
+            <a:pPr marL="685800" lvl="1" indent="-228600">
+              <a:buFont typeface="Arial" panose="020B0604020202020204" pitchFamily="34" charset="0"/>
+              <a:buAutoNum type="arabicPeriod"/>
             </a:pPr>
             <a:r>
               <a:rPr lang="en-US" dirty="0"/>
-              <a:t>Potential age differences</a:t>
-            </a:r>
-          </a:p>
-          <a:p>
-            <a:pPr marL="171450" lvl="0" indent="-171450">
-              <a:buFont typeface="Arial" panose="020B0604020202020204" pitchFamily="34" charset="0"/>
-              <a:buChar char="•"/>
+              <a:t>Consumption</a:t>
+            </a:r>
+          </a:p>
+          <a:p>
+            <a:pPr marL="1143000" lvl="2" indent="-228600">
+              <a:buFont typeface="Arial" panose="020B0604020202020204" pitchFamily="34" charset="0"/>
+              <a:buAutoNum type="arabicPeriod"/>
             </a:pPr>
             <a:r>
               <a:rPr lang="en-US" dirty="0"/>
-              <a:t>Internet</a:t>
-            </a:r>
-          </a:p>
-          <a:p>
-            <a:pPr marL="628650" lvl="1" indent="-171450">
-              <a:buFont typeface="Arial" panose="020B0604020202020204" pitchFamily="34" charset="0"/>
-              <a:buChar char="•"/>
+              <a:t>Broad range of political engagement/interest</a:t>
+            </a:r>
+          </a:p>
+          <a:p>
+            <a:pPr marL="1143000" lvl="2" indent="-228600">
+              <a:buFont typeface="Arial" panose="020B0604020202020204" pitchFamily="34" charset="0"/>
+              <a:buAutoNum type="arabicPeriod"/>
             </a:pPr>
             <a:r>
               <a:rPr lang="en-US" dirty="0"/>
-              <a:t>More Liberal = More Internet Usage </a:t>
-            </a:r>
-          </a:p>
-          <a:p>
-            <a:pPr marL="628650" lvl="1" indent="-171450">
-              <a:buFont typeface="Arial" panose="020B0604020202020204" pitchFamily="34" charset="0"/>
-              <a:buChar char="•"/>
-            </a:pPr>
-            <a:r>
-              <a:rPr lang="en-US" dirty="0"/>
-              <a:t>(immigration and LGBTQ+ rights)</a:t>
-            </a:r>
-          </a:p>
-          <a:p>
-            <a:pPr marL="171450" lvl="0" indent="-171450">
-              <a:buFont typeface="Arial" panose="020B0604020202020204" pitchFamily="34" charset="0"/>
-              <a:buChar char="•"/>
-            </a:pPr>
-            <a:r>
-              <a:rPr lang="en-US" dirty="0"/>
-              <a:t>Ideologies</a:t>
-            </a:r>
-          </a:p>
-          <a:p>
-            <a:pPr marL="628650" lvl="1" indent="-171450">
-              <a:buFont typeface="Arial" panose="020B0604020202020204" pitchFamily="34" charset="0"/>
-              <a:buChar char="•"/>
-            </a:pPr>
-            <a:r>
-              <a:rPr lang="en-US" dirty="0"/>
-              <a:t>Personal Social &amp; Economic Freedoms</a:t>
-            </a:r>
+              <a:t>Apoliticism</a:t>
+            </a:r>
+          </a:p>
+          <a:p>
+            <a:pPr marL="685800" lvl="1" indent="-228600">
+              <a:buFont typeface="Arial" panose="020B0604020202020204" pitchFamily="34" charset="0"/>
+              <a:buAutoNum type="arabicPeriod"/>
+            </a:pPr>
+            <a:endParaRPr lang="en-US" dirty="0"/>
           </a:p>
         </p:txBody>
       </p:sp>
@@ -2045,7 +2131,7 @@
           <a:p>
             <a:fld id="{31FC1487-0650-4F2A-9010-4AFC00465C48}" type="datetimeFigureOut">
               <a:rPr lang="en-US" smtClean="0"/>
-              <a:t>9/19/2021</a:t>
+              <a:t>9/20/2021</a:t>
             </a:fld>
             <a:endParaRPr lang="en-US"/>
           </a:p>
@@ -2341,7 +2427,7 @@
           <a:p>
             <a:fld id="{31FC1487-0650-4F2A-9010-4AFC00465C48}" type="datetimeFigureOut">
               <a:rPr lang="en-US" smtClean="0"/>
-              <a:t>9/19/2021</a:t>
+              <a:t>9/20/2021</a:t>
             </a:fld>
             <a:endParaRPr lang="en-US"/>
           </a:p>
@@ -2589,7 +2675,7 @@
           <a:p>
             <a:fld id="{31FC1487-0650-4F2A-9010-4AFC00465C48}" type="datetimeFigureOut">
               <a:rPr lang="en-US" smtClean="0"/>
-              <a:t>9/19/2021</a:t>
+              <a:t>9/20/2021</a:t>
             </a:fld>
             <a:endParaRPr lang="en-US"/>
           </a:p>
@@ -3129,7 +3215,7 @@
           <a:p>
             <a:fld id="{31FC1487-0650-4F2A-9010-4AFC00465C48}" type="datetimeFigureOut">
               <a:rPr lang="en-US" smtClean="0"/>
-              <a:t>9/19/2021</a:t>
+              <a:t>9/20/2021</a:t>
             </a:fld>
             <a:endParaRPr lang="en-US"/>
           </a:p>
@@ -3377,7 +3463,7 @@
           <a:p>
             <a:fld id="{31FC1487-0650-4F2A-9010-4AFC00465C48}" type="datetimeFigureOut">
               <a:rPr lang="en-US" smtClean="0"/>
-              <a:t>9/19/2021</a:t>
+              <a:t>9/20/2021</a:t>
             </a:fld>
             <a:endParaRPr lang="en-US"/>
           </a:p>
@@ -3909,7 +3995,7 @@
           <a:p>
             <a:fld id="{31FC1487-0650-4F2A-9010-4AFC00465C48}" type="datetimeFigureOut">
               <a:rPr lang="en-US" smtClean="0"/>
-              <a:t>9/19/2021</a:t>
+              <a:t>9/20/2021</a:t>
             </a:fld>
             <a:endParaRPr lang="en-US"/>
           </a:p>
@@ -4206,7 +4292,7 @@
           <a:p>
             <a:fld id="{31FC1487-0650-4F2A-9010-4AFC00465C48}" type="datetimeFigureOut">
               <a:rPr lang="en-US" smtClean="0"/>
-              <a:t>9/19/2021</a:t>
+              <a:t>9/20/2021</a:t>
             </a:fld>
             <a:endParaRPr lang="en-US"/>
           </a:p>
@@ -4380,7 +4466,7 @@
           <a:p>
             <a:fld id="{31FC1487-0650-4F2A-9010-4AFC00465C48}" type="datetimeFigureOut">
               <a:rPr lang="en-US" smtClean="0"/>
-              <a:t>9/19/2021</a:t>
+              <a:t>9/20/2021</a:t>
             </a:fld>
             <a:endParaRPr lang="en-US"/>
           </a:p>
@@ -4560,7 +4646,7 @@
           <a:p>
             <a:fld id="{31FC1487-0650-4F2A-9010-4AFC00465C48}" type="datetimeFigureOut">
               <a:rPr lang="en-US" smtClean="0"/>
-              <a:t>9/19/2021</a:t>
+              <a:t>9/20/2021</a:t>
             </a:fld>
             <a:endParaRPr lang="en-US"/>
           </a:p>
@@ -4730,7 +4816,7 @@
           <a:p>
             <a:fld id="{31FC1487-0650-4F2A-9010-4AFC00465C48}" type="datetimeFigureOut">
               <a:rPr lang="en-US" smtClean="0"/>
-              <a:t>9/19/2021</a:t>
+              <a:t>9/20/2021</a:t>
             </a:fld>
             <a:endParaRPr lang="en-US"/>
           </a:p>
@@ -4981,7 +5067,7 @@
           <a:p>
             <a:fld id="{31FC1487-0650-4F2A-9010-4AFC00465C48}" type="datetimeFigureOut">
               <a:rPr lang="en-US" smtClean="0"/>
-              <a:t>9/19/2021</a:t>
+              <a:t>9/20/2021</a:t>
             </a:fld>
             <a:endParaRPr lang="en-US"/>
           </a:p>
@@ -5278,7 +5364,7 @@
           <a:p>
             <a:fld id="{31FC1487-0650-4F2A-9010-4AFC00465C48}" type="datetimeFigureOut">
               <a:rPr lang="en-US" smtClean="0"/>
-              <a:t>9/19/2021</a:t>
+              <a:t>9/20/2021</a:t>
             </a:fld>
             <a:endParaRPr lang="en-US"/>
           </a:p>
@@ -5720,7 +5806,7 @@
           <a:p>
             <a:fld id="{31FC1487-0650-4F2A-9010-4AFC00465C48}" type="datetimeFigureOut">
               <a:rPr lang="en-US" smtClean="0"/>
-              <a:t>9/19/2021</a:t>
+              <a:t>9/20/2021</a:t>
             </a:fld>
             <a:endParaRPr lang="en-US"/>
           </a:p>
@@ -5838,7 +5924,7 @@
           <a:p>
             <a:fld id="{31FC1487-0650-4F2A-9010-4AFC00465C48}" type="datetimeFigureOut">
               <a:rPr lang="en-US" smtClean="0"/>
-              <a:t>9/19/2021</a:t>
+              <a:t>9/20/2021</a:t>
             </a:fld>
             <a:endParaRPr lang="en-US"/>
           </a:p>
@@ -5933,7 +6019,7 @@
           <a:p>
             <a:fld id="{31FC1487-0650-4F2A-9010-4AFC00465C48}" type="datetimeFigureOut">
               <a:rPr lang="en-US" smtClean="0"/>
-              <a:t>9/19/2021</a:t>
+              <a:t>9/20/2021</a:t>
             </a:fld>
             <a:endParaRPr lang="en-US"/>
           </a:p>
@@ -6216,7 +6302,7 @@
           <a:p>
             <a:fld id="{31FC1487-0650-4F2A-9010-4AFC00465C48}" type="datetimeFigureOut">
               <a:rPr lang="en-US" smtClean="0"/>
-              <a:t>9/19/2021</a:t>
+              <a:t>9/20/2021</a:t>
             </a:fld>
             <a:endParaRPr lang="en-US"/>
           </a:p>
@@ -6507,7 +6593,7 @@
           <a:p>
             <a:fld id="{31FC1487-0650-4F2A-9010-4AFC00465C48}" type="datetimeFigureOut">
               <a:rPr lang="en-US" smtClean="0"/>
-              <a:t>9/19/2021</a:t>
+              <a:t>9/20/2021</a:t>
             </a:fld>
             <a:endParaRPr lang="en-US"/>
           </a:p>
@@ -7037,7 +7123,7 @@
           <a:p>
             <a:fld id="{31FC1487-0650-4F2A-9010-4AFC00465C48}" type="datetimeFigureOut">
               <a:rPr lang="en-US" smtClean="0"/>
-              <a:t>9/19/2021</a:t>
+              <a:t>9/20/2021</a:t>
             </a:fld>
             <a:endParaRPr lang="en-US"/>
           </a:p>
@@ -7557,7 +7643,7 @@
     <p:bg>
       <p:bgPr>
         <a:blipFill rotWithShape="1">
-          <a:blip r:embed="rId2">
+          <a:blip r:embed="rId3">
             <a:duotone>
               <a:schemeClr val="bg2">
                 <a:shade val="76000"/>
@@ -7769,13 +7855,13 @@
           <p:nvPr/>
         </p:nvPicPr>
         <p:blipFill>
-          <a:blip r:embed="rId3">
+          <a:blip r:embed="rId4">
             <a:extLst>
               <a:ext uri="{28A0092B-C50C-407E-A947-70E740481C1C}">
                 <a14:useLocalDpi xmlns:a14="http://schemas.microsoft.com/office/drawing/2010/main" val="0"/>
               </a:ext>
               <a:ext uri="{96DAC541-7B7A-43D3-8B79-37D633B846F1}">
-                <asvg:svgBlip xmlns:asvg="http://schemas.microsoft.com/office/drawing/2016/SVG/main" r:embed="rId4"/>
+                <asvg:svgBlip xmlns:asvg="http://schemas.microsoft.com/office/drawing/2016/SVG/main" r:embed="rId5"/>
               </a:ext>
             </a:extLst>
           </a:blip>
@@ -8021,7 +8107,7 @@
                 <a:latin typeface="Verdana" panose="020B0604030504040204" pitchFamily="34" charset="0"/>
                 <a:ea typeface="Verdana" panose="020B0604030504040204" pitchFamily="34" charset="0"/>
               </a:rPr>
-              <a:t>Mixed-Type Responses</a:t>
+              <a:t>Country-specific</a:t>
             </a:r>
           </a:p>
           <a:p>
@@ -8034,7 +8120,7 @@
                 <a:latin typeface="Verdana" panose="020B0604030504040204" pitchFamily="34" charset="0"/>
                 <a:ea typeface="Verdana" panose="020B0604030504040204" pitchFamily="34" charset="0"/>
               </a:rPr>
-              <a:t>Country-Specific</a:t>
+              <a:t>Mixed-type responses</a:t>
             </a:r>
           </a:p>
           <a:p>
@@ -8060,7 +8146,7 @@
                 <a:latin typeface="Verdana" panose="020B0604030504040204" pitchFamily="34" charset="0"/>
                 <a:ea typeface="Verdana" panose="020B0604030504040204" pitchFamily="34" charset="0"/>
               </a:rPr>
-              <a:t>Reordering Responses</a:t>
+              <a:t>Reordering responses</a:t>
             </a:r>
           </a:p>
         </p:txBody>
@@ -8242,33 +8328,7 @@
                 <a:latin typeface="Verdana" panose="020B0604030504040204" pitchFamily="34" charset="0"/>
                 <a:ea typeface="Verdana" panose="020B0604030504040204" pitchFamily="34" charset="0"/>
               </a:rPr>
-              <a:t>Which columns?</a:t>
-            </a:r>
-          </a:p>
-          <a:p>
-            <a:pPr marL="742950" lvl="1" indent="-285750">
-              <a:buFont typeface="Arial" panose="020B0604020202020204" pitchFamily="34" charset="0"/>
-              <a:buChar char="•"/>
-            </a:pPr>
-            <a:r>
-              <a:rPr lang="en-US" dirty="0">
-                <a:latin typeface="Verdana" panose="020B0604030504040204" pitchFamily="34" charset="0"/>
-                <a:ea typeface="Verdana" panose="020B0604030504040204" pitchFamily="34" charset="0"/>
-              </a:rPr>
-              <a:t>Finally, dropped rows with missing values</a:t>
-            </a:r>
-          </a:p>
-          <a:p>
-            <a:pPr marL="1200150" lvl="2" indent="-285750">
-              <a:buFont typeface="Arial" panose="020B0604020202020204" pitchFamily="34" charset="0"/>
-              <a:buChar char="•"/>
-            </a:pPr>
-            <a:r>
-              <a:rPr lang="en-US" dirty="0">
-                <a:latin typeface="Verdana" panose="020B0604030504040204" pitchFamily="34" charset="0"/>
-                <a:ea typeface="Verdana" panose="020B0604030504040204" pitchFamily="34" charset="0"/>
-              </a:rPr>
-              <a:t>How many removed?</a:t>
+              <a:t>Dropped rows with missing values</a:t>
             </a:r>
           </a:p>
           <a:p>
@@ -8504,7 +8564,7 @@
                 <a:latin typeface="Verdana" panose="020B0604030504040204" pitchFamily="34" charset="0"/>
                 <a:ea typeface="Verdana" panose="020B0604030504040204" pitchFamily="34" charset="0"/>
               </a:rPr>
-              <a:t>Range of Responses</a:t>
+              <a:t>Broad range or common response</a:t>
             </a:r>
           </a:p>
           <a:p>
@@ -8530,7 +8590,7 @@
                 <a:latin typeface="Verdana" panose="020B0604030504040204" pitchFamily="34" charset="0"/>
                 <a:ea typeface="Verdana" panose="020B0604030504040204" pitchFamily="34" charset="0"/>
               </a:rPr>
-              <a:t>10 Components Selected</a:t>
+              <a:t>10 components selected</a:t>
             </a:r>
           </a:p>
           <a:p>
@@ -8543,7 +8603,7 @@
                 <a:latin typeface="Verdana" panose="020B0604030504040204" pitchFamily="34" charset="0"/>
                 <a:ea typeface="Verdana" panose="020B0604030504040204" pitchFamily="34" charset="0"/>
               </a:rPr>
-              <a:t>Difficult to Describe After 5</a:t>
+              <a:t>Difficult to describe after 5</a:t>
             </a:r>
           </a:p>
         </p:txBody>
@@ -9335,11 +9395,13 @@
         <p:spPr>
           <a:xfrm>
             <a:off x="1484311" y="685799"/>
-            <a:ext cx="3549121" cy="464906"/>
+            <a:ext cx="5780089" cy="464906"/>
           </a:xfrm>
         </p:spPr>
         <p:txBody>
-          <a:bodyPr/>
+          <a:bodyPr>
+            <a:normAutofit/>
+          </a:bodyPr>
           <a:lstStyle/>
           <a:p>
             <a:r>
@@ -9347,7 +9409,7 @@
                 <a:latin typeface="Verdana" panose="020B0604030504040204" pitchFamily="34" charset="0"/>
                 <a:ea typeface="Verdana" panose="020B0604030504040204" pitchFamily="34" charset="0"/>
               </a:rPr>
-              <a:t>Policy Relevance</a:t>
+              <a:t>Main Takeaways &amp; Policy Relevance</a:t>
             </a:r>
           </a:p>
         </p:txBody>
@@ -9402,7 +9464,7 @@
                 <a:latin typeface="Verdana" panose="020B0604030504040204" pitchFamily="34" charset="0"/>
                 <a:ea typeface="Verdana" panose="020B0604030504040204" pitchFamily="34" charset="0"/>
               </a:rPr>
-              <a:t>Spanned political ideology</a:t>
+              <a:t>Spanned ideology and potentially age</a:t>
             </a:r>
           </a:p>
           <a:p>
@@ -9415,11 +9477,11 @@
                 <a:latin typeface="Verdana" panose="020B0604030504040204" pitchFamily="34" charset="0"/>
                 <a:ea typeface="Verdana" panose="020B0604030504040204" pitchFamily="34" charset="0"/>
               </a:rPr>
-              <a:t>Influence vs. Institutions</a:t>
-            </a:r>
-          </a:p>
-          <a:p>
-            <a:pPr marL="742950" lvl="1" indent="-285750">
+              <a:t>Disenfranchisement vs. Distrust</a:t>
+            </a:r>
+          </a:p>
+          <a:p>
+            <a:pPr marL="285750" indent="-285750" algn="l">
               <a:buFont typeface="Arial" panose="020B0604020202020204" pitchFamily="34" charset="0"/>
               <a:buChar char="•"/>
             </a:pPr>
@@ -9428,11 +9490,11 @@
                 <a:latin typeface="Verdana" panose="020B0604030504040204" pitchFamily="34" charset="0"/>
                 <a:ea typeface="Verdana" panose="020B0604030504040204" pitchFamily="34" charset="0"/>
               </a:rPr>
-              <a:t>Potential age differences</a:t>
-            </a:r>
-          </a:p>
-          <a:p>
-            <a:pPr marL="285750" indent="-285750" algn="l">
+              <a:t>Engagement</a:t>
+            </a:r>
+          </a:p>
+          <a:p>
+            <a:pPr marL="742950" lvl="1" indent="-285750">
               <a:buFont typeface="Arial" panose="020B0604020202020204" pitchFamily="34" charset="0"/>
               <a:buChar char="•"/>
             </a:pPr>
@@ -9445,7 +9507,7 @@
             </a:r>
           </a:p>
           <a:p>
-            <a:pPr marL="742950" lvl="1" indent="-285750">
+            <a:pPr marL="1200150" lvl="2" indent="-285750">
               <a:buFont typeface="Arial" panose="020B0604020202020204" pitchFamily="34" charset="0"/>
               <a:buChar char="•"/>
             </a:pPr>
@@ -9458,7 +9520,7 @@
             </a:r>
           </a:p>
           <a:p>
-            <a:pPr marL="285750" indent="-285750" algn="l">
+            <a:pPr marL="742950" lvl="1" indent="-285750">
               <a:buFont typeface="Arial" panose="020B0604020202020204" pitchFamily="34" charset="0"/>
               <a:buChar char="•"/>
             </a:pPr>
@@ -9467,11 +9529,11 @@
                 <a:latin typeface="Verdana" panose="020B0604030504040204" pitchFamily="34" charset="0"/>
                 <a:ea typeface="Verdana" panose="020B0604030504040204" pitchFamily="34" charset="0"/>
               </a:rPr>
-              <a:t>Media [2]</a:t>
-            </a:r>
-          </a:p>
-          <a:p>
-            <a:pPr marL="742950" lvl="1" indent="-285750">
+              <a:t>Media Consumption [2]</a:t>
+            </a:r>
+          </a:p>
+          <a:p>
+            <a:pPr marL="1200150" lvl="2" indent="-285750">
               <a:buFont typeface="Arial" panose="020B0604020202020204" pitchFamily="34" charset="0"/>
               <a:buChar char="•"/>
             </a:pPr>
@@ -9480,132 +9542,901 @@
                 <a:latin typeface="Verdana" panose="020B0604030504040204" pitchFamily="34" charset="0"/>
                 <a:ea typeface="Verdana" panose="020B0604030504040204" pitchFamily="34" charset="0"/>
               </a:rPr>
-              <a:t>High variance in political news consumption</a:t>
-            </a:r>
-          </a:p>
-          <a:p>
-            <a:pPr marL="742950" lvl="1" indent="-285750">
-              <a:buFont typeface="Arial" panose="020B0604020202020204" pitchFamily="34" charset="0"/>
-              <a:buChar char="•"/>
-            </a:pPr>
-            <a:r>
-              <a:rPr lang="en-US" dirty="0">
-                <a:latin typeface="Verdana" panose="020B0604030504040204" pitchFamily="34" charset="0"/>
-                <a:ea typeface="Verdana" panose="020B0604030504040204" pitchFamily="34" charset="0"/>
-              </a:rPr>
-              <a:t>Potential measure of disengagement</a:t>
-            </a:r>
-          </a:p>
-          <a:p>
-            <a:pPr marL="285750" indent="-285750" algn="l">
-              <a:buFont typeface="Arial" panose="020B0604020202020204" pitchFamily="34" charset="0"/>
-              <a:buChar char="•"/>
-            </a:pPr>
-            <a:r>
-              <a:rPr lang="en-US" dirty="0">
-                <a:latin typeface="Verdana" panose="020B0604030504040204" pitchFamily="34" charset="0"/>
-                <a:ea typeface="Verdana" panose="020B0604030504040204" pitchFamily="34" charset="0"/>
-              </a:rPr>
-              <a:t>Personal Ideological Axes [4 &amp; 5]</a:t>
-            </a:r>
-          </a:p>
-          <a:p>
-            <a:pPr marL="742950" lvl="1" indent="-285750">
-              <a:buFont typeface="Arial" panose="020B0604020202020204" pitchFamily="34" charset="0"/>
-              <a:buChar char="•"/>
-            </a:pPr>
-            <a:r>
-              <a:rPr lang="en-US" dirty="0">
-                <a:latin typeface="Verdana" panose="020B0604030504040204" pitchFamily="34" charset="0"/>
-                <a:ea typeface="Verdana" panose="020B0604030504040204" pitchFamily="34" charset="0"/>
-              </a:rPr>
-              <a:t>Social and economic individualism</a:t>
-            </a:r>
-          </a:p>
-        </p:txBody>
-      </p:sp>
-      <p:pic>
-        <p:nvPicPr>
-          <p:cNvPr id="6" name="Graphic 5" descr="Wireless outline">
+              <a:t>Split in engagement</a:t>
+            </a:r>
+          </a:p>
+        </p:txBody>
+      </p:sp>
+    </p:spTree>
+    <p:extLst>
+      <p:ext uri="{BB962C8B-B14F-4D97-AF65-F5344CB8AC3E}">
+        <p14:creationId xmlns:p14="http://schemas.microsoft.com/office/powerpoint/2010/main" val="1694714186"/>
+      </p:ext>
+    </p:extLst>
+  </p:cSld>
+  <p:clrMapOvr>
+    <a:masterClrMapping/>
+  </p:clrMapOvr>
+</p:sld>
+</file>
+
+<file path=ppt/slides/slide7.xml><?xml version="1.0" encoding="utf-8"?>
+<p:sld xmlns:a="http://schemas.openxmlformats.org/drawingml/2006/main" xmlns:r="http://schemas.openxmlformats.org/officeDocument/2006/relationships" xmlns:p="http://schemas.openxmlformats.org/presentationml/2006/main">
+  <p:cSld>
+    <p:bg>
+      <p:bgPr>
+        <a:blipFill rotWithShape="1">
+          <a:blip r:embed="rId2">
+            <a:duotone>
+              <a:schemeClr val="bg2">
+                <a:shade val="76000"/>
+                <a:satMod val="180000"/>
+              </a:schemeClr>
+              <a:schemeClr val="bg2">
+                <a:tint val="80000"/>
+                <a:satMod val="120000"/>
+                <a:lumMod val="180000"/>
+              </a:schemeClr>
+            </a:duotone>
+          </a:blip>
+          <a:stretch/>
+        </a:blipFill>
+        <a:effectLst/>
+      </p:bgPr>
+    </p:bg>
+    <p:spTree>
+      <p:nvGrpSpPr>
+        <p:cNvPr id="1" name=""/>
+        <p:cNvGrpSpPr/>
+        <p:nvPr/>
+      </p:nvGrpSpPr>
+      <p:grpSpPr>
+        <a:xfrm>
+          <a:off x="0" y="0"/>
+          <a:ext cx="0" cy="0"/>
+          <a:chOff x="0" y="0"/>
+          <a:chExt cx="0" cy="0"/>
+        </a:xfrm>
+      </p:grpSpPr>
+      <p:grpSp>
+        <p:nvGrpSpPr>
+          <p:cNvPr id="27" name="Group 6">
             <a:extLst>
               <a:ext uri="{FF2B5EF4-FFF2-40B4-BE49-F238E27FC236}">
-                <a16:creationId xmlns:a16="http://schemas.microsoft.com/office/drawing/2014/main" id="{63D0A19F-68D8-4480-9AB3-31044D8F84FA}"/>
+                <a16:creationId xmlns:a16="http://schemas.microsoft.com/office/drawing/2014/main" id="{E9D059B6-ADD8-488A-B346-63289E90D13F}"/>
+              </a:ext>
+              <a:ext uri="{C183D7F6-B498-43B3-948B-1728B52AA6E4}">
+                <adec:decorative xmlns:adec="http://schemas.microsoft.com/office/drawing/2017/decorative" val="1"/>
               </a:ext>
             </a:extLst>
           </p:cNvPr>
-          <p:cNvPicPr>
-            <a:picLocks noChangeAspect="1"/>
-          </p:cNvPicPr>
-          <p:nvPr/>
-        </p:nvPicPr>
-        <p:blipFill>
-          <a:blip r:embed="rId3">
+          <p:cNvGrpSpPr>
+            <a:grpSpLocks noGrp="1" noUngrp="1" noRot="1" noChangeAspect="1" noMove="1" noResize="1"/>
+          </p:cNvGrpSpPr>
+          <p:nvPr>
+            <p:extLst>
+              <p:ext uri="{386F3935-93C4-4BCD-93E2-E3B085C9AB24}">
+                <p16:designElem xmlns:p16="http://schemas.microsoft.com/office/powerpoint/2015/main" val="1"/>
+              </p:ext>
+            </p:extLst>
+          </p:nvPr>
+        </p:nvGrpSpPr>
+        <p:grpSpPr>
+          <a:xfrm>
+            <a:off x="546100" y="-4763"/>
+            <a:ext cx="5014912" cy="6862763"/>
+            <a:chOff x="2928938" y="-4763"/>
+            <a:chExt cx="5014912" cy="6862763"/>
+          </a:xfrm>
+        </p:grpSpPr>
+        <p:sp>
+          <p:nvSpPr>
+            <p:cNvPr id="8" name="Freeform 6">
+              <a:extLst>
+                <a:ext uri="{FF2B5EF4-FFF2-40B4-BE49-F238E27FC236}">
+                  <a16:creationId xmlns:a16="http://schemas.microsoft.com/office/drawing/2014/main" id="{F69B42B4-BC82-4495-A6F9-A28167B56A0E}"/>
+                </a:ext>
+                <a:ext uri="{C183D7F6-B498-43B3-948B-1728B52AA6E4}">
+                  <adec:decorative xmlns:adec="http://schemas.microsoft.com/office/drawing/2017/decorative" val="1"/>
+                </a:ext>
+              </a:extLst>
+            </p:cNvPr>
+            <p:cNvSpPr/>
+            <p:nvPr>
+              <p:extLst>
+                <p:ext uri="{386F3935-93C4-4BCD-93E2-E3B085C9AB24}">
+                  <p16:designElem xmlns:p16="http://schemas.microsoft.com/office/powerpoint/2015/main" val="1"/>
+                </p:ext>
+              </p:extLst>
+            </p:nvPr>
+          </p:nvSpPr>
+          <p:spPr bwMode="auto">
+            <a:xfrm>
+              <a:off x="3367088" y="-4763"/>
+              <a:ext cx="1063625" cy="2782888"/>
+            </a:xfrm>
+            <a:custGeom>
+              <a:avLst/>
+              <a:gdLst/>
+              <a:ahLst/>
+              <a:cxnLst/>
+              <a:rect l="0" t="0" r="r" b="b"/>
+              <a:pathLst>
+                <a:path w="670" h="1753">
+                  <a:moveTo>
+                    <a:pt x="0" y="1696"/>
+                  </a:moveTo>
+                  <a:lnTo>
+                    <a:pt x="225" y="1753"/>
+                  </a:lnTo>
+                  <a:lnTo>
+                    <a:pt x="670" y="0"/>
+                  </a:lnTo>
+                  <a:lnTo>
+                    <a:pt x="430" y="0"/>
+                  </a:lnTo>
+                  <a:lnTo>
+                    <a:pt x="0" y="1696"/>
+                  </a:lnTo>
+                  <a:close/>
+                </a:path>
+              </a:pathLst>
+            </a:custGeom>
+            <a:solidFill>
+              <a:schemeClr val="accent1"/>
+            </a:solidFill>
+            <a:ln>
+              <a:noFill/>
+            </a:ln>
+          </p:spPr>
+        </p:sp>
+        <p:sp>
+          <p:nvSpPr>
+            <p:cNvPr id="9" name="Freeform 7">
+              <a:extLst>
+                <a:ext uri="{FF2B5EF4-FFF2-40B4-BE49-F238E27FC236}">
+                  <a16:creationId xmlns:a16="http://schemas.microsoft.com/office/drawing/2014/main" id="{83CC168C-2AD4-4FFB-9F25-420ED6514C7D}"/>
+                </a:ext>
+                <a:ext uri="{C183D7F6-B498-43B3-948B-1728B52AA6E4}">
+                  <adec:decorative xmlns:adec="http://schemas.microsoft.com/office/drawing/2017/decorative" val="1"/>
+                </a:ext>
+              </a:extLst>
+            </p:cNvPr>
+            <p:cNvSpPr/>
+            <p:nvPr>
+              <p:extLst>
+                <p:ext uri="{386F3935-93C4-4BCD-93E2-E3B085C9AB24}">
+                  <p16:designElem xmlns:p16="http://schemas.microsoft.com/office/powerpoint/2015/main" val="1"/>
+                </p:ext>
+              </p:extLst>
+            </p:nvPr>
+          </p:nvSpPr>
+          <p:spPr bwMode="auto">
+            <a:xfrm>
+              <a:off x="2928938" y="-4763"/>
+              <a:ext cx="1035050" cy="2673350"/>
+            </a:xfrm>
+            <a:custGeom>
+              <a:avLst/>
+              <a:gdLst/>
+              <a:ahLst/>
+              <a:cxnLst/>
+              <a:rect l="0" t="0" r="r" b="b"/>
+              <a:pathLst>
+                <a:path w="652" h="1684">
+                  <a:moveTo>
+                    <a:pt x="225" y="1684"/>
+                  </a:moveTo>
+                  <a:lnTo>
+                    <a:pt x="652" y="0"/>
+                  </a:lnTo>
+                  <a:lnTo>
+                    <a:pt x="411" y="0"/>
+                  </a:lnTo>
+                  <a:lnTo>
+                    <a:pt x="0" y="1627"/>
+                  </a:lnTo>
+                  <a:lnTo>
+                    <a:pt x="219" y="1681"/>
+                  </a:lnTo>
+                  <a:lnTo>
+                    <a:pt x="225" y="1684"/>
+                  </a:lnTo>
+                  <a:close/>
+                </a:path>
+              </a:pathLst>
+            </a:custGeom>
+            <a:solidFill>
+              <a:schemeClr val="tx1">
+                <a:lumMod val="65000"/>
+                <a:lumOff val="35000"/>
+              </a:schemeClr>
+            </a:solidFill>
+            <a:ln>
+              <a:noFill/>
+            </a:ln>
+          </p:spPr>
+        </p:sp>
+        <p:sp>
+          <p:nvSpPr>
+            <p:cNvPr id="10" name="Freeform 9">
+              <a:extLst>
+                <a:ext uri="{FF2B5EF4-FFF2-40B4-BE49-F238E27FC236}">
+                  <a16:creationId xmlns:a16="http://schemas.microsoft.com/office/drawing/2014/main" id="{6C9F369A-6158-4AE8-BA04-138A9DFFAE05}"/>
+                </a:ext>
+                <a:ext uri="{C183D7F6-B498-43B3-948B-1728B52AA6E4}">
+                  <adec:decorative xmlns:adec="http://schemas.microsoft.com/office/drawing/2017/decorative" val="1"/>
+                </a:ext>
+              </a:extLst>
+            </p:cNvPr>
+            <p:cNvSpPr/>
+            <p:nvPr>
+              <p:extLst>
+                <p:ext uri="{386F3935-93C4-4BCD-93E2-E3B085C9AB24}">
+                  <p16:designElem xmlns:p16="http://schemas.microsoft.com/office/powerpoint/2015/main" val="1"/>
+                </p:ext>
+              </p:extLst>
+            </p:nvPr>
+          </p:nvSpPr>
+          <p:spPr bwMode="auto">
+            <a:xfrm>
+              <a:off x="2928938" y="2582862"/>
+              <a:ext cx="2693987" cy="4275138"/>
+            </a:xfrm>
+            <a:custGeom>
+              <a:avLst/>
+              <a:gdLst/>
+              <a:ahLst/>
+              <a:cxnLst/>
+              <a:rect l="0" t="0" r="r" b="b"/>
+              <a:pathLst>
+                <a:path w="1697" h="2693">
+                  <a:moveTo>
+                    <a:pt x="0" y="0"/>
+                  </a:moveTo>
+                  <a:lnTo>
+                    <a:pt x="1622" y="2693"/>
+                  </a:lnTo>
+                  <a:lnTo>
+                    <a:pt x="1697" y="2693"/>
+                  </a:lnTo>
+                  <a:lnTo>
+                    <a:pt x="0" y="0"/>
+                  </a:lnTo>
+                  <a:close/>
+                </a:path>
+              </a:pathLst>
+            </a:custGeom>
+            <a:solidFill>
+              <a:schemeClr val="tx1">
+                <a:lumMod val="85000"/>
+                <a:lumOff val="15000"/>
+              </a:schemeClr>
+            </a:solidFill>
+            <a:ln>
+              <a:noFill/>
+            </a:ln>
+          </p:spPr>
+        </p:sp>
+        <p:sp>
+          <p:nvSpPr>
+            <p:cNvPr id="11" name="Freeform 10">
+              <a:extLst>
+                <a:ext uri="{FF2B5EF4-FFF2-40B4-BE49-F238E27FC236}">
+                  <a16:creationId xmlns:a16="http://schemas.microsoft.com/office/drawing/2014/main" id="{FC7B1DF4-AD98-42A8-820F-667A3DCC40AC}"/>
+                </a:ext>
+                <a:ext uri="{C183D7F6-B498-43B3-948B-1728B52AA6E4}">
+                  <adec:decorative xmlns:adec="http://schemas.microsoft.com/office/drawing/2017/decorative" val="1"/>
+                </a:ext>
+              </a:extLst>
+            </p:cNvPr>
+            <p:cNvSpPr/>
+            <p:nvPr>
+              <p:extLst>
+                <p:ext uri="{386F3935-93C4-4BCD-93E2-E3B085C9AB24}">
+                  <p16:designElem xmlns:p16="http://schemas.microsoft.com/office/powerpoint/2015/main" val="1"/>
+                </p:ext>
+              </p:extLst>
+            </p:nvPr>
+          </p:nvSpPr>
+          <p:spPr bwMode="auto">
+            <a:xfrm>
+              <a:off x="3371850" y="2692400"/>
+              <a:ext cx="3332162" cy="4165600"/>
+            </a:xfrm>
+            <a:custGeom>
+              <a:avLst/>
+              <a:gdLst/>
+              <a:ahLst/>
+              <a:cxnLst/>
+              <a:rect l="0" t="0" r="r" b="b"/>
+              <a:pathLst>
+                <a:path w="2099" h="2624">
+                  <a:moveTo>
+                    <a:pt x="2099" y="2624"/>
+                  </a:moveTo>
+                  <a:lnTo>
+                    <a:pt x="0" y="0"/>
+                  </a:lnTo>
+                  <a:lnTo>
+                    <a:pt x="2021" y="2624"/>
+                  </a:lnTo>
+                  <a:lnTo>
+                    <a:pt x="2099" y="2624"/>
+                  </a:lnTo>
+                  <a:close/>
+                </a:path>
+              </a:pathLst>
+            </a:custGeom>
+            <a:solidFill>
+              <a:schemeClr val="accent1">
+                <a:lumMod val="50000"/>
+              </a:schemeClr>
+            </a:solidFill>
+            <a:ln>
+              <a:noFill/>
+            </a:ln>
+          </p:spPr>
+        </p:sp>
+        <p:sp>
+          <p:nvSpPr>
+            <p:cNvPr id="12" name="Freeform 11">
+              <a:extLst>
+                <a:ext uri="{FF2B5EF4-FFF2-40B4-BE49-F238E27FC236}">
+                  <a16:creationId xmlns:a16="http://schemas.microsoft.com/office/drawing/2014/main" id="{61C58B74-3656-4FD5-AC47-EE3A59EBB818}"/>
+                </a:ext>
+                <a:ext uri="{C183D7F6-B498-43B3-948B-1728B52AA6E4}">
+                  <adec:decorative xmlns:adec="http://schemas.microsoft.com/office/drawing/2017/decorative" val="1"/>
+                </a:ext>
+              </a:extLst>
+            </p:cNvPr>
+            <p:cNvSpPr/>
+            <p:nvPr>
+              <p:extLst>
+                <p:ext uri="{386F3935-93C4-4BCD-93E2-E3B085C9AB24}">
+                  <p16:designElem xmlns:p16="http://schemas.microsoft.com/office/powerpoint/2015/main" val="1"/>
+                </p:ext>
+              </p:extLst>
+            </p:nvPr>
+          </p:nvSpPr>
+          <p:spPr bwMode="auto">
+            <a:xfrm>
+              <a:off x="3367088" y="2687637"/>
+              <a:ext cx="4576762" cy="4170363"/>
+            </a:xfrm>
+            <a:custGeom>
+              <a:avLst/>
+              <a:gdLst/>
+              <a:ahLst/>
+              <a:cxnLst/>
+              <a:rect l="0" t="0" r="r" b="b"/>
+              <a:pathLst>
+                <a:path w="2883" h="2627">
+                  <a:moveTo>
+                    <a:pt x="0" y="0"/>
+                  </a:moveTo>
+                  <a:lnTo>
+                    <a:pt x="3" y="3"/>
+                  </a:lnTo>
+                  <a:lnTo>
+                    <a:pt x="2102" y="2627"/>
+                  </a:lnTo>
+                  <a:lnTo>
+                    <a:pt x="2883" y="2627"/>
+                  </a:lnTo>
+                  <a:lnTo>
+                    <a:pt x="225" y="57"/>
+                  </a:lnTo>
+                  <a:lnTo>
+                    <a:pt x="0" y="0"/>
+                  </a:lnTo>
+                  <a:close/>
+                </a:path>
+              </a:pathLst>
+            </a:custGeom>
+            <a:solidFill>
+              <a:schemeClr val="accent1">
+                <a:lumMod val="75000"/>
+              </a:schemeClr>
+            </a:solidFill>
+            <a:ln>
+              <a:noFill/>
+            </a:ln>
+          </p:spPr>
+        </p:sp>
+        <p:sp>
+          <p:nvSpPr>
+            <p:cNvPr id="13" name="Freeform 12">
+              <a:extLst>
+                <a:ext uri="{FF2B5EF4-FFF2-40B4-BE49-F238E27FC236}">
+                  <a16:creationId xmlns:a16="http://schemas.microsoft.com/office/drawing/2014/main" id="{8B349A01-D803-4A18-B608-47BFCED43435}"/>
+                </a:ext>
+                <a:ext uri="{C183D7F6-B498-43B3-948B-1728B52AA6E4}">
+                  <adec:decorative xmlns:adec="http://schemas.microsoft.com/office/drawing/2017/decorative" val="1"/>
+                </a:ext>
+              </a:extLst>
+            </p:cNvPr>
+            <p:cNvSpPr/>
+            <p:nvPr>
+              <p:extLst>
+                <p:ext uri="{386F3935-93C4-4BCD-93E2-E3B085C9AB24}">
+                  <p16:designElem xmlns:p16="http://schemas.microsoft.com/office/powerpoint/2015/main" val="1"/>
+                </p:ext>
+              </p:extLst>
+            </p:nvPr>
+          </p:nvSpPr>
+          <p:spPr bwMode="auto">
+            <a:xfrm>
+              <a:off x="2928938" y="2578100"/>
+              <a:ext cx="3584575" cy="4279900"/>
+            </a:xfrm>
+            <a:custGeom>
+              <a:avLst/>
+              <a:gdLst/>
+              <a:ahLst/>
+              <a:cxnLst/>
+              <a:rect l="0" t="0" r="r" b="b"/>
+              <a:pathLst>
+                <a:path w="2258" h="2696">
+                  <a:moveTo>
+                    <a:pt x="2258" y="2696"/>
+                  </a:moveTo>
+                  <a:lnTo>
+                    <a:pt x="264" y="111"/>
+                  </a:lnTo>
+                  <a:lnTo>
+                    <a:pt x="228" y="60"/>
+                  </a:lnTo>
+                  <a:lnTo>
+                    <a:pt x="225" y="57"/>
+                  </a:lnTo>
+                  <a:lnTo>
+                    <a:pt x="0" y="0"/>
+                  </a:lnTo>
+                  <a:lnTo>
+                    <a:pt x="0" y="3"/>
+                  </a:lnTo>
+                  <a:lnTo>
+                    <a:pt x="1697" y="2696"/>
+                  </a:lnTo>
+                  <a:lnTo>
+                    <a:pt x="2258" y="2696"/>
+                  </a:lnTo>
+                  <a:close/>
+                </a:path>
+              </a:pathLst>
+            </a:custGeom>
+            <a:solidFill>
+              <a:schemeClr val="tx1">
+                <a:lumMod val="75000"/>
+                <a:lumOff val="25000"/>
+              </a:schemeClr>
+            </a:solidFill>
+            <a:ln>
+              <a:noFill/>
+            </a:ln>
+          </p:spPr>
+        </p:sp>
+      </p:grpSp>
+      <p:sp useBgFill="1">
+        <p:nvSpPr>
+          <p:cNvPr id="28" name="Rectangle 14">
             <a:extLst>
-              <a:ext uri="{28A0092B-C50C-407E-A947-70E740481C1C}">
-                <a14:useLocalDpi xmlns:a14="http://schemas.microsoft.com/office/drawing/2010/main" val="0"/>
+              <a:ext uri="{FF2B5EF4-FFF2-40B4-BE49-F238E27FC236}">
+                <a16:creationId xmlns:a16="http://schemas.microsoft.com/office/drawing/2014/main" id="{15655827-B42D-4180-88D3-D83F25E4BD1C}"/>
               </a:ext>
-              <a:ext uri="{96DAC541-7B7A-43D3-8B79-37D633B846F1}">
-                <asvg:svgBlip xmlns:asvg="http://schemas.microsoft.com/office/drawing/2016/SVG/main" r:embed="rId4"/>
+              <a:ext uri="{C183D7F6-B498-43B3-948B-1728B52AA6E4}">
+                <adec:decorative xmlns:adec="http://schemas.microsoft.com/office/drawing/2017/decorative" val="1"/>
               </a:ext>
             </a:extLst>
-          </a:blip>
-          <a:stretch>
-            <a:fillRect/>
-          </a:stretch>
-        </p:blipFill>
+          </p:cNvPr>
+          <p:cNvSpPr>
+            <a:spLocks noGrp="1" noRot="1" noChangeAspect="1" noMove="1" noResize="1" noEditPoints="1" noAdjustHandles="1" noChangeArrowheads="1" noChangeShapeType="1" noTextEdit="1"/>
+          </p:cNvSpPr>
+          <p:nvPr>
+            <p:extLst>
+              <p:ext uri="{386F3935-93C4-4BCD-93E2-E3B085C9AB24}">
+                <p16:designElem xmlns:p16="http://schemas.microsoft.com/office/powerpoint/2015/main" val="1"/>
+              </p:ext>
+            </p:extLst>
+          </p:nvPr>
+        </p:nvSpPr>
         <p:spPr>
           <a:xfrm>
-            <a:off x="4459540" y="2971800"/>
-            <a:ext cx="914400" cy="914400"/>
+            <a:off x="0" y="0"/>
+            <a:ext cx="12192000" cy="6858000"/>
           </a:xfrm>
           <a:prstGeom prst="rect">
             <a:avLst/>
           </a:prstGeom>
+          <a:ln>
+            <a:noFill/>
+          </a:ln>
+          <a:effectLst/>
         </p:spPr>
-      </p:pic>
-      <p:pic>
-        <p:nvPicPr>
-          <p:cNvPr id="8" name="Graphic 7" descr="Newspaper with solid fill">
+        <p:txBody>
+          <a:bodyPr rtlCol="0" anchor="ctr"/>
+          <a:lstStyle/>
+          <a:p>
+            <a:pPr algn="ctr"/>
+            <a:endParaRPr lang="en-US"/>
+          </a:p>
+        </p:txBody>
+      </p:sp>
+      <p:sp>
+        <p:nvSpPr>
+          <p:cNvPr id="29" name="Freeform: Shape 16">
             <a:extLst>
               <a:ext uri="{FF2B5EF4-FFF2-40B4-BE49-F238E27FC236}">
-                <a16:creationId xmlns:a16="http://schemas.microsoft.com/office/drawing/2014/main" id="{49619E44-8715-4896-805E-58DAC9D33888}"/>
+                <a16:creationId xmlns:a16="http://schemas.microsoft.com/office/drawing/2014/main" id="{24ACCB06-563C-4ADE-B4D6-1FE9F723C7D9}"/>
+              </a:ext>
+              <a:ext uri="{C183D7F6-B498-43B3-948B-1728B52AA6E4}">
+                <adec:decorative xmlns:adec="http://schemas.microsoft.com/office/drawing/2017/decorative" val="1"/>
               </a:ext>
             </a:extLst>
           </p:cNvPr>
-          <p:cNvPicPr>
-            <a:picLocks noChangeAspect="1"/>
-          </p:cNvPicPr>
-          <p:nvPr/>
-        </p:nvPicPr>
-        <p:blipFill>
-          <a:blip r:embed="rId5">
+          <p:cNvSpPr>
+            <a:spLocks noGrp="1" noRot="1" noChangeAspect="1" noMove="1" noResize="1" noEditPoints="1" noAdjustHandles="1" noChangeArrowheads="1" noChangeShapeType="1" noTextEdit="1"/>
+          </p:cNvSpPr>
+          <p:nvPr>
+            <p:extLst>
+              <p:ext uri="{386F3935-93C4-4BCD-93E2-E3B085C9AB24}">
+                <p16:designElem xmlns:p16="http://schemas.microsoft.com/office/powerpoint/2015/main" val="1"/>
+              </p:ext>
+            </p:extLst>
+          </p:nvPr>
+        </p:nvSpPr>
+        <p:spPr bwMode="auto">
+          <a:xfrm>
+            <a:off x="0" y="3955594"/>
+            <a:ext cx="1828958" cy="2902407"/>
+          </a:xfrm>
+          <a:custGeom>
+            <a:avLst/>
+            <a:gdLst>
+              <a:gd name="connsiteX0" fmla="*/ 0 w 1828958"/>
+              <a:gd name="connsiteY0" fmla="*/ 0 h 2902407"/>
+              <a:gd name="connsiteX1" fmla="*/ 1828958 w 1828958"/>
+              <a:gd name="connsiteY1" fmla="*/ 2902407 h 2902407"/>
+              <a:gd name="connsiteX2" fmla="*/ 1709896 w 1828958"/>
+              <a:gd name="connsiteY2" fmla="*/ 2902407 h 2902407"/>
+              <a:gd name="connsiteX3" fmla="*/ 0 w 1828958"/>
+              <a:gd name="connsiteY3" fmla="*/ 63474 h 2902407"/>
+            </a:gdLst>
+            <a:ahLst/>
+            <a:cxnLst>
+              <a:cxn ang="0">
+                <a:pos x="connsiteX0" y="connsiteY0"/>
+              </a:cxn>
+              <a:cxn ang="0">
+                <a:pos x="connsiteX1" y="connsiteY1"/>
+              </a:cxn>
+              <a:cxn ang="0">
+                <a:pos x="connsiteX2" y="connsiteY2"/>
+              </a:cxn>
+              <a:cxn ang="0">
+                <a:pos x="connsiteX3" y="connsiteY3"/>
+              </a:cxn>
+            </a:cxnLst>
+            <a:rect l="l" t="t" r="r" b="b"/>
+            <a:pathLst>
+              <a:path w="1828958" h="2902407">
+                <a:moveTo>
+                  <a:pt x="0" y="0"/>
+                </a:moveTo>
+                <a:lnTo>
+                  <a:pt x="1828958" y="2902407"/>
+                </a:lnTo>
+                <a:lnTo>
+                  <a:pt x="1709896" y="2902407"/>
+                </a:lnTo>
+                <a:lnTo>
+                  <a:pt x="0" y="63474"/>
+                </a:lnTo>
+                <a:close/>
+              </a:path>
+            </a:pathLst>
+          </a:custGeom>
+          <a:solidFill>
+            <a:srgbClr val="262626"/>
+          </a:solidFill>
+          <a:ln>
+            <a:noFill/>
+          </a:ln>
+        </p:spPr>
+      </p:sp>
+      <p:sp>
+        <p:nvSpPr>
+          <p:cNvPr id="30" name="Freeform: Shape 18">
             <a:extLst>
-              <a:ext uri="{28A0092B-C50C-407E-A947-70E740481C1C}">
-                <a14:useLocalDpi xmlns:a14="http://schemas.microsoft.com/office/drawing/2010/main" val="0"/>
+              <a:ext uri="{FF2B5EF4-FFF2-40B4-BE49-F238E27FC236}">
+                <a16:creationId xmlns:a16="http://schemas.microsoft.com/office/drawing/2014/main" id="{40761ECD-D92B-46AE-82CA-640023D282F9}"/>
               </a:ext>
-              <a:ext uri="{96DAC541-7B7A-43D3-8B79-37D633B846F1}">
-                <asvg:svgBlip xmlns:asvg="http://schemas.microsoft.com/office/drawing/2016/SVG/main" r:embed="rId6"/>
+              <a:ext uri="{C183D7F6-B498-43B3-948B-1728B52AA6E4}">
+                <adec:decorative xmlns:adec="http://schemas.microsoft.com/office/drawing/2017/decorative" val="1"/>
               </a:ext>
             </a:extLst>
-          </a:blip>
-          <a:stretch>
-            <a:fillRect/>
-          </a:stretch>
-        </p:blipFill>
+          </p:cNvPr>
+          <p:cNvSpPr>
+            <a:spLocks noGrp="1" noRot="1" noChangeAspect="1" noMove="1" noResize="1" noEditPoints="1" noAdjustHandles="1" noChangeArrowheads="1" noChangeShapeType="1" noTextEdit="1"/>
+          </p:cNvSpPr>
+          <p:nvPr>
+            <p:extLst>
+              <p:ext uri="{386F3935-93C4-4BCD-93E2-E3B085C9AB24}">
+                <p16:designElem xmlns:p16="http://schemas.microsoft.com/office/powerpoint/2015/main" val="1"/>
+              </p:ext>
+            </p:extLst>
+          </p:nvPr>
+        </p:nvSpPr>
+        <p:spPr bwMode="auto">
+          <a:xfrm>
+            <a:off x="1" y="3220098"/>
+            <a:ext cx="2910045" cy="3637903"/>
+          </a:xfrm>
+          <a:custGeom>
+            <a:avLst/>
+            <a:gdLst>
+              <a:gd name="connsiteX0" fmla="*/ 0 w 2910045"/>
+              <a:gd name="connsiteY0" fmla="*/ 0 h 3637903"/>
+              <a:gd name="connsiteX1" fmla="*/ 2910045 w 2910045"/>
+              <a:gd name="connsiteY1" fmla="*/ 3637903 h 3637903"/>
+              <a:gd name="connsiteX2" fmla="*/ 2786220 w 2910045"/>
+              <a:gd name="connsiteY2" fmla="*/ 3637903 h 3637903"/>
+              <a:gd name="connsiteX3" fmla="*/ 0 w 2910045"/>
+              <a:gd name="connsiteY3" fmla="*/ 20366 h 3637903"/>
+            </a:gdLst>
+            <a:ahLst/>
+            <a:cxnLst>
+              <a:cxn ang="0">
+                <a:pos x="connsiteX0" y="connsiteY0"/>
+              </a:cxn>
+              <a:cxn ang="0">
+                <a:pos x="connsiteX1" y="connsiteY1"/>
+              </a:cxn>
+              <a:cxn ang="0">
+                <a:pos x="connsiteX2" y="connsiteY2"/>
+              </a:cxn>
+              <a:cxn ang="0">
+                <a:pos x="connsiteX3" y="connsiteY3"/>
+              </a:cxn>
+            </a:cxnLst>
+            <a:rect l="l" t="t" r="r" b="b"/>
+            <a:pathLst>
+              <a:path w="2910045" h="3637903">
+                <a:moveTo>
+                  <a:pt x="0" y="0"/>
+                </a:moveTo>
+                <a:lnTo>
+                  <a:pt x="2910045" y="3637903"/>
+                </a:lnTo>
+                <a:lnTo>
+                  <a:pt x="2786220" y="3637903"/>
+                </a:lnTo>
+                <a:lnTo>
+                  <a:pt x="0" y="20366"/>
+                </a:lnTo>
+                <a:close/>
+              </a:path>
+            </a:pathLst>
+          </a:custGeom>
+          <a:solidFill>
+            <a:schemeClr val="accent1">
+              <a:lumMod val="50000"/>
+            </a:schemeClr>
+          </a:solidFill>
+          <a:ln>
+            <a:noFill/>
+          </a:ln>
+        </p:spPr>
+      </p:sp>
+      <p:sp>
+        <p:nvSpPr>
+          <p:cNvPr id="21" name="Freeform: Shape 20">
+            <a:extLst>
+              <a:ext uri="{FF2B5EF4-FFF2-40B4-BE49-F238E27FC236}">
+                <a16:creationId xmlns:a16="http://schemas.microsoft.com/office/drawing/2014/main" id="{9A928607-C55C-40FD-B2DF-6CD6A7226A71}"/>
+              </a:ext>
+              <a:ext uri="{C183D7F6-B498-43B3-948B-1728B52AA6E4}">
+                <adec:decorative xmlns:adec="http://schemas.microsoft.com/office/drawing/2017/decorative" val="1"/>
+              </a:ext>
+            </a:extLst>
+          </p:cNvPr>
+          <p:cNvSpPr>
+            <a:spLocks noGrp="1" noRot="1" noChangeAspect="1" noMove="1" noResize="1" noEditPoints="1" noAdjustHandles="1" noChangeArrowheads="1" noChangeShapeType="1" noTextEdit="1"/>
+          </p:cNvSpPr>
+          <p:nvPr>
+            <p:extLst>
+              <p:ext uri="{386F3935-93C4-4BCD-93E2-E3B085C9AB24}">
+                <p16:designElem xmlns:p16="http://schemas.microsoft.com/office/powerpoint/2015/main" val="1"/>
+              </p:ext>
+            </p:extLst>
+          </p:nvPr>
+        </p:nvSpPr>
+        <p:spPr bwMode="auto">
+          <a:xfrm>
+            <a:off x="1" y="2845509"/>
+            <a:ext cx="4149883" cy="4012491"/>
+          </a:xfrm>
+          <a:custGeom>
+            <a:avLst/>
+            <a:gdLst>
+              <a:gd name="connsiteX0" fmla="*/ 0 w 4149883"/>
+              <a:gd name="connsiteY0" fmla="*/ 0 h 4012491"/>
+              <a:gd name="connsiteX1" fmla="*/ 4149883 w 4149883"/>
+              <a:gd name="connsiteY1" fmla="*/ 4012491 h 4012491"/>
+              <a:gd name="connsiteX2" fmla="*/ 2910046 w 4149883"/>
+              <a:gd name="connsiteY2" fmla="*/ 4012491 h 4012491"/>
+              <a:gd name="connsiteX3" fmla="*/ 0 w 4149883"/>
+              <a:gd name="connsiteY3" fmla="*/ 374587 h 4012491"/>
+            </a:gdLst>
+            <a:ahLst/>
+            <a:cxnLst>
+              <a:cxn ang="0">
+                <a:pos x="connsiteX0" y="connsiteY0"/>
+              </a:cxn>
+              <a:cxn ang="0">
+                <a:pos x="connsiteX1" y="connsiteY1"/>
+              </a:cxn>
+              <a:cxn ang="0">
+                <a:pos x="connsiteX2" y="connsiteY2"/>
+              </a:cxn>
+              <a:cxn ang="0">
+                <a:pos x="connsiteX3" y="connsiteY3"/>
+              </a:cxn>
+            </a:cxnLst>
+            <a:rect l="l" t="t" r="r" b="b"/>
+            <a:pathLst>
+              <a:path w="4149883" h="4012491">
+                <a:moveTo>
+                  <a:pt x="0" y="0"/>
+                </a:moveTo>
+                <a:lnTo>
+                  <a:pt x="4149883" y="4012491"/>
+                </a:lnTo>
+                <a:lnTo>
+                  <a:pt x="2910046" y="4012491"/>
+                </a:lnTo>
+                <a:lnTo>
+                  <a:pt x="0" y="374587"/>
+                </a:lnTo>
+                <a:close/>
+              </a:path>
+            </a:pathLst>
+          </a:custGeom>
+          <a:solidFill>
+            <a:schemeClr val="accent1">
+              <a:lumMod val="75000"/>
+            </a:schemeClr>
+          </a:solidFill>
+          <a:ln>
+            <a:noFill/>
+          </a:ln>
+        </p:spPr>
+      </p:sp>
+      <p:sp>
+        <p:nvSpPr>
+          <p:cNvPr id="23" name="Freeform: Shape 22">
+            <a:extLst>
+              <a:ext uri="{FF2B5EF4-FFF2-40B4-BE49-F238E27FC236}">
+                <a16:creationId xmlns:a16="http://schemas.microsoft.com/office/drawing/2014/main" id="{400A20C1-29A4-43E0-AB15-7931F76F8C2D}"/>
+              </a:ext>
+              <a:ext uri="{C183D7F6-B498-43B3-948B-1728B52AA6E4}">
+                <adec:decorative xmlns:adec="http://schemas.microsoft.com/office/drawing/2017/decorative" val="1"/>
+              </a:ext>
+            </a:extLst>
+          </p:cNvPr>
+          <p:cNvSpPr>
+            <a:spLocks noGrp="1" noRot="1" noChangeAspect="1" noMove="1" noResize="1" noEditPoints="1" noAdjustHandles="1" noChangeArrowheads="1" noChangeShapeType="1" noTextEdit="1"/>
+          </p:cNvSpPr>
+          <p:nvPr>
+            <p:extLst>
+              <p:ext uri="{386F3935-93C4-4BCD-93E2-E3B085C9AB24}">
+                <p16:designElem xmlns:p16="http://schemas.microsoft.com/office/powerpoint/2015/main" val="1"/>
+              </p:ext>
+            </p:extLst>
+          </p:nvPr>
+        </p:nvSpPr>
+        <p:spPr bwMode="auto">
+          <a:xfrm>
+            <a:off x="0" y="3332410"/>
+            <a:ext cx="2719546" cy="3525590"/>
+          </a:xfrm>
+          <a:custGeom>
+            <a:avLst/>
+            <a:gdLst>
+              <a:gd name="connsiteX0" fmla="*/ 0 w 2719546"/>
+              <a:gd name="connsiteY0" fmla="*/ 0 h 3525590"/>
+              <a:gd name="connsiteX1" fmla="*/ 2719546 w 2719546"/>
+              <a:gd name="connsiteY1" fmla="*/ 3525590 h 3525590"/>
+              <a:gd name="connsiteX2" fmla="*/ 1828959 w 2719546"/>
+              <a:gd name="connsiteY2" fmla="*/ 3525590 h 3525590"/>
+              <a:gd name="connsiteX3" fmla="*/ 0 w 2719546"/>
+              <a:gd name="connsiteY3" fmla="*/ 623183 h 3525590"/>
+            </a:gdLst>
+            <a:ahLst/>
+            <a:cxnLst>
+              <a:cxn ang="0">
+                <a:pos x="connsiteX0" y="connsiteY0"/>
+              </a:cxn>
+              <a:cxn ang="0">
+                <a:pos x="connsiteX1" y="connsiteY1"/>
+              </a:cxn>
+              <a:cxn ang="0">
+                <a:pos x="connsiteX2" y="connsiteY2"/>
+              </a:cxn>
+              <a:cxn ang="0">
+                <a:pos x="connsiteX3" y="connsiteY3"/>
+              </a:cxn>
+            </a:cxnLst>
+            <a:rect l="l" t="t" r="r" b="b"/>
+            <a:pathLst>
+              <a:path w="2719546" h="3525590">
+                <a:moveTo>
+                  <a:pt x="0" y="0"/>
+                </a:moveTo>
+                <a:lnTo>
+                  <a:pt x="2719546" y="3525590"/>
+                </a:lnTo>
+                <a:lnTo>
+                  <a:pt x="1828959" y="3525590"/>
+                </a:lnTo>
+                <a:lnTo>
+                  <a:pt x="0" y="623183"/>
+                </a:lnTo>
+                <a:close/>
+              </a:path>
+            </a:pathLst>
+          </a:custGeom>
+          <a:solidFill>
+            <a:srgbClr val="404040"/>
+          </a:solidFill>
+          <a:ln>
+            <a:noFill/>
+          </a:ln>
+        </p:spPr>
+      </p:sp>
+      <p:sp>
+        <p:nvSpPr>
+          <p:cNvPr id="2" name="Title 1">
+            <a:extLst>
+              <a:ext uri="{FF2B5EF4-FFF2-40B4-BE49-F238E27FC236}">
+                <a16:creationId xmlns:a16="http://schemas.microsoft.com/office/drawing/2014/main" id="{F875F054-9A79-4944-BCDC-EBFD814DCA27}"/>
+              </a:ext>
+            </a:extLst>
+          </p:cNvPr>
+          <p:cNvSpPr>
+            <a:spLocks noGrp="1"/>
+          </p:cNvSpPr>
+          <p:nvPr>
+            <p:ph type="title"/>
+          </p:nvPr>
+        </p:nvSpPr>
         <p:spPr>
           <a:xfrm>
-            <a:off x="7250757" y="3722238"/>
-            <a:ext cx="914400" cy="914400"/>
+            <a:off x="1524000" y="643468"/>
+            <a:ext cx="9144000" cy="3618898"/>
           </a:xfrm>
-          <a:prstGeom prst="rect">
-            <a:avLst/>
-          </a:prstGeom>
         </p:spPr>
-      </p:pic>
+        <p:txBody>
+          <a:bodyPr vert="horz" lIns="91440" tIns="45720" rIns="91440" bIns="45720" rtlCol="0" anchor="b">
+            <a:normAutofit/>
+          </a:bodyPr>
+          <a:lstStyle/>
+          <a:p>
+            <a:r>
+              <a:rPr lang="en-US" sz="7200" dirty="0">
+                <a:latin typeface="Verdana" panose="020B0604030504040204" pitchFamily="34" charset="0"/>
+                <a:ea typeface="Verdana" panose="020B0604030504040204" pitchFamily="34" charset="0"/>
+              </a:rPr>
+              <a:t>Questions?</a:t>
+            </a:r>
+          </a:p>
+        </p:txBody>
+      </p:sp>
     </p:spTree>
     <p:extLst>
       <p:ext uri="{BB962C8B-B14F-4D97-AF65-F5344CB8AC3E}">
-        <p14:creationId xmlns:p14="http://schemas.microsoft.com/office/powerpoint/2010/main" val="1694714186"/>
+        <p14:creationId xmlns:p14="http://schemas.microsoft.com/office/powerpoint/2010/main" val="1749868988"/>
       </p:ext>
     </p:extLst>
   </p:cSld>

</xml_diff>